<commit_message>
La til innledende og avsluttende foiler
</commit_message>
<xml_diff>
--- a/Presentasjon.pptx
+++ b/Presentasjon.pptx
@@ -7,19 +7,29 @@
     <p:sldMasterId id="2147483705" r:id="rId7"/>
   </p:sldMasterIdLst>
   <p:notesMasterIdLst>
-    <p:notesMasterId r:id="rId15"/>
+    <p:notesMasterId r:id="rId25"/>
   </p:notesMasterIdLst>
   <p:handoutMasterIdLst>
-    <p:handoutMasterId r:id="rId16"/>
+    <p:handoutMasterId r:id="rId26"/>
   </p:handoutMasterIdLst>
   <p:sldIdLst>
-    <p:sldId id="256" r:id="rId8"/>
-    <p:sldId id="257" r:id="rId9"/>
-    <p:sldId id="258" r:id="rId10"/>
-    <p:sldId id="259" r:id="rId11"/>
-    <p:sldId id="260" r:id="rId12"/>
-    <p:sldId id="261" r:id="rId13"/>
-    <p:sldId id="262" r:id="rId14"/>
+    <p:sldId id="263" r:id="rId8"/>
+    <p:sldId id="269" r:id="rId9"/>
+    <p:sldId id="264" r:id="rId10"/>
+    <p:sldId id="265" r:id="rId11"/>
+    <p:sldId id="268" r:id="rId12"/>
+    <p:sldId id="267" r:id="rId13"/>
+    <p:sldId id="266" r:id="rId14"/>
+    <p:sldId id="256" r:id="rId15"/>
+    <p:sldId id="257" r:id="rId16"/>
+    <p:sldId id="258" r:id="rId17"/>
+    <p:sldId id="259" r:id="rId18"/>
+    <p:sldId id="260" r:id="rId19"/>
+    <p:sldId id="261" r:id="rId20"/>
+    <p:sldId id="262" r:id="rId21"/>
+    <p:sldId id="270" r:id="rId22"/>
+    <p:sldId id="272" r:id="rId23"/>
+    <p:sldId id="271" r:id="rId24"/>
   </p:sldIdLst>
   <p:sldSz cx="12192000" cy="6858000"/>
   <p:notesSz cx="6858000" cy="9144000"/>
@@ -222,7 +232,7 @@
           <a:p>
             <a:fld id="{54C52192-B826-4AE0-9CD6-BEA9467D12B3}" type="datetimeFigureOut">
               <a:rPr lang="nb-NO" smtClean="0"/>
-              <a:t>26.10.2017</a:t>
+              <a:t>28.10.2017</a:t>
             </a:fld>
             <a:endParaRPr lang="nb-NO"/>
           </a:p>
@@ -387,7 +397,7 @@
           <a:p>
             <a:fld id="{2696BCB2-2760-41B1-A1BE-7886EF110FCB}" type="datetimeFigureOut">
               <a:rPr lang="nb-NO" smtClean="0"/>
-              <a:t>26.10.2017</a:t>
+              <a:t>28.10.2017</a:t>
             </a:fld>
             <a:endParaRPr lang="nb-NO"/>
           </a:p>
@@ -4020,6 +4030,401 @@
 </file>
 
 <file path=ppt/slideLayouts/slideLayout20.xml><?xml version="1.0" encoding="utf-8"?>
+<p:sldLayout xmlns:a="http://schemas.openxmlformats.org/drawingml/2006/main" xmlns:r="http://schemas.openxmlformats.org/officeDocument/2006/relationships" xmlns:p="http://schemas.openxmlformats.org/presentationml/2006/main" showMasterSp="0" type="title">
+  <p:cSld name="Kapittelforside">
+    <p:spTree>
+      <p:nvGrpSpPr>
+        <p:cNvPr id="1" name=""/>
+        <p:cNvGrpSpPr/>
+        <p:nvPr/>
+      </p:nvGrpSpPr>
+      <p:grpSpPr>
+        <a:xfrm>
+          <a:off x="0" y="0"/>
+          <a:ext cx="0" cy="0"/>
+          <a:chOff x="0" y="0"/>
+          <a:chExt cx="0" cy="0"/>
+        </a:xfrm>
+      </p:grpSpPr>
+      <p:sp>
+        <p:nvSpPr>
+          <p:cNvPr id="2" name="Title 1"/>
+          <p:cNvSpPr>
+            <a:spLocks noGrp="1"/>
+          </p:cNvSpPr>
+          <p:nvPr>
+            <p:ph type="ctrTitle"/>
+          </p:nvPr>
+        </p:nvSpPr>
+        <p:spPr>
+          <a:xfrm>
+            <a:off x="1524000" y="2450303"/>
+            <a:ext cx="9144000" cy="923925"/>
+          </a:xfrm>
+        </p:spPr>
+        <p:txBody>
+          <a:bodyPr anchor="b">
+            <a:noAutofit/>
+          </a:bodyPr>
+          <a:lstStyle>
+            <a:lvl1pPr algn="ctr">
+              <a:defRPr sz="4500"/>
+            </a:lvl1pPr>
+          </a:lstStyle>
+          <a:p>
+            <a:r>
+              <a:rPr lang="en-US" noProof="0" smtClean="0"/>
+              <a:t>Click to edit Master title style</a:t>
+            </a:r>
+            <a:endParaRPr lang="nb-NO" noProof="0" dirty="0"/>
+          </a:p>
+        </p:txBody>
+      </p:sp>
+      <p:sp>
+        <p:nvSpPr>
+          <p:cNvPr id="3" name="Subtitle 2"/>
+          <p:cNvSpPr>
+            <a:spLocks noGrp="1"/>
+          </p:cNvSpPr>
+          <p:nvPr>
+            <p:ph type="subTitle" idx="1"/>
+          </p:nvPr>
+        </p:nvSpPr>
+        <p:spPr>
+          <a:xfrm>
+            <a:off x="1524000" y="3814762"/>
+            <a:ext cx="9144000" cy="778669"/>
+          </a:xfrm>
+        </p:spPr>
+        <p:txBody>
+          <a:bodyPr>
+            <a:noAutofit/>
+          </a:bodyPr>
+          <a:lstStyle>
+            <a:lvl1pPr marL="0" indent="0" algn="ctr">
+              <a:buNone/>
+              <a:defRPr sz="2500"/>
+            </a:lvl1pPr>
+            <a:lvl2pPr marL="457200" indent="0" algn="ctr">
+              <a:buNone/>
+              <a:defRPr sz="2000"/>
+            </a:lvl2pPr>
+            <a:lvl3pPr marL="914400" indent="0" algn="ctr">
+              <a:buNone/>
+              <a:defRPr sz="1800"/>
+            </a:lvl3pPr>
+            <a:lvl4pPr marL="1371600" indent="0" algn="ctr">
+              <a:buNone/>
+              <a:defRPr sz="1600"/>
+            </a:lvl4pPr>
+            <a:lvl5pPr marL="1828800" indent="0" algn="ctr">
+              <a:buNone/>
+              <a:defRPr sz="1600"/>
+            </a:lvl5pPr>
+            <a:lvl6pPr marL="2286000" indent="0" algn="ctr">
+              <a:buNone/>
+              <a:defRPr sz="1600"/>
+            </a:lvl6pPr>
+            <a:lvl7pPr marL="2743200" indent="0" algn="ctr">
+              <a:buNone/>
+              <a:defRPr sz="1600"/>
+            </a:lvl7pPr>
+            <a:lvl8pPr marL="3200400" indent="0" algn="ctr">
+              <a:buNone/>
+              <a:defRPr sz="1600"/>
+            </a:lvl8pPr>
+            <a:lvl9pPr marL="3657600" indent="0" algn="ctr">
+              <a:buNone/>
+              <a:defRPr sz="1600"/>
+            </a:lvl9pPr>
+          </a:lstStyle>
+          <a:p>
+            <a:r>
+              <a:rPr lang="en-US" noProof="0" smtClean="0"/>
+              <a:t>Click to edit Master subtitle style</a:t>
+            </a:r>
+            <a:endParaRPr lang="nb-NO" noProof="0" dirty="0"/>
+          </a:p>
+        </p:txBody>
+      </p:sp>
+      <p:sp>
+        <p:nvSpPr>
+          <p:cNvPr id="6" name="Slide Number Placeholder 5"/>
+          <p:cNvSpPr>
+            <a:spLocks noGrp="1"/>
+          </p:cNvSpPr>
+          <p:nvPr>
+            <p:ph type="sldNum" sz="quarter" idx="12"/>
+          </p:nvPr>
+        </p:nvSpPr>
+        <p:spPr>
+          <a:xfrm>
+            <a:off x="11415713" y="6492875"/>
+            <a:ext cx="512762" cy="365125"/>
+          </a:xfrm>
+          <a:prstGeom prst="rect">
+            <a:avLst/>
+          </a:prstGeom>
+        </p:spPr>
+        <p:txBody>
+          <a:bodyPr/>
+          <a:lstStyle/>
+          <a:p>
+            <a:fld id="{618FBC2E-150B-49D4-A5E9-D014A10F5E5B}" type="slidenum">
+              <a:rPr lang="nb-NO" smtClean="0"/>
+              <a:t>‹#›</a:t>
+            </a:fld>
+            <a:endParaRPr lang="nb-NO"/>
+          </a:p>
+        </p:txBody>
+      </p:sp>
+      <p:grpSp>
+        <p:nvGrpSpPr>
+          <p:cNvPr id="7" name="Group 6"/>
+          <p:cNvGrpSpPr/>
+          <p:nvPr userDrawn="1"/>
+        </p:nvGrpSpPr>
+        <p:grpSpPr>
+          <a:xfrm>
+            <a:off x="5760721" y="1617044"/>
+            <a:ext cx="683394" cy="683394"/>
+            <a:chOff x="5293895" y="2030930"/>
+            <a:chExt cx="683394" cy="683394"/>
+          </a:xfrm>
+        </p:grpSpPr>
+        <p:sp>
+          <p:nvSpPr>
+            <p:cNvPr id="8" name="Oval 7"/>
+            <p:cNvSpPr/>
+            <p:nvPr/>
+          </p:nvSpPr>
+          <p:spPr>
+            <a:xfrm>
+              <a:off x="5476775" y="2213810"/>
+              <a:ext cx="317634" cy="317634"/>
+            </a:xfrm>
+            <a:prstGeom prst="ellipse">
+              <a:avLst/>
+            </a:prstGeom>
+            <a:noFill/>
+            <a:ln w="50800">
+              <a:solidFill>
+                <a:srgbClr val="FA6100"/>
+              </a:solidFill>
+            </a:ln>
+          </p:spPr>
+          <p:style>
+            <a:lnRef idx="2">
+              <a:schemeClr val="accent1">
+                <a:shade val="50000"/>
+              </a:schemeClr>
+            </a:lnRef>
+            <a:fillRef idx="1">
+              <a:schemeClr val="accent1"/>
+            </a:fillRef>
+            <a:effectRef idx="0">
+              <a:schemeClr val="accent1"/>
+            </a:effectRef>
+            <a:fontRef idx="minor">
+              <a:schemeClr val="lt1"/>
+            </a:fontRef>
+          </p:style>
+          <p:txBody>
+            <a:bodyPr rtlCol="0" anchor="ctr"/>
+            <a:lstStyle/>
+            <a:p>
+              <a:pPr algn="ctr"/>
+              <a:endParaRPr lang="en-US"/>
+            </a:p>
+          </p:txBody>
+        </p:sp>
+        <p:sp>
+          <p:nvSpPr>
+            <p:cNvPr id="9" name="Oval 8"/>
+            <p:cNvSpPr/>
+            <p:nvPr/>
+          </p:nvSpPr>
+          <p:spPr>
+            <a:xfrm>
+              <a:off x="5293895" y="2030930"/>
+              <a:ext cx="683394" cy="683394"/>
+            </a:xfrm>
+            <a:prstGeom prst="ellipse">
+              <a:avLst/>
+            </a:prstGeom>
+            <a:noFill/>
+            <a:ln w="50800">
+              <a:solidFill>
+                <a:srgbClr val="FA6100"/>
+              </a:solidFill>
+            </a:ln>
+          </p:spPr>
+          <p:style>
+            <a:lnRef idx="2">
+              <a:schemeClr val="accent1">
+                <a:shade val="50000"/>
+              </a:schemeClr>
+            </a:lnRef>
+            <a:fillRef idx="1">
+              <a:schemeClr val="accent1"/>
+            </a:fillRef>
+            <a:effectRef idx="0">
+              <a:schemeClr val="accent1"/>
+            </a:effectRef>
+            <a:fontRef idx="minor">
+              <a:schemeClr val="lt1"/>
+            </a:fontRef>
+          </p:style>
+          <p:txBody>
+            <a:bodyPr rtlCol="0" anchor="ctr"/>
+            <a:lstStyle/>
+            <a:p>
+              <a:pPr algn="ctr"/>
+              <a:endParaRPr lang="en-US"/>
+            </a:p>
+          </p:txBody>
+        </p:sp>
+      </p:grpSp>
+      <p:grpSp>
+        <p:nvGrpSpPr>
+          <p:cNvPr id="11" name="Group 10"/>
+          <p:cNvGrpSpPr/>
+          <p:nvPr userDrawn="1"/>
+        </p:nvGrpSpPr>
+        <p:grpSpPr>
+          <a:xfrm>
+            <a:off x="11950995" y="657823"/>
+            <a:ext cx="241005" cy="659219"/>
+            <a:chOff x="11950995" y="552893"/>
+            <a:chExt cx="241005" cy="659219"/>
+          </a:xfrm>
+        </p:grpSpPr>
+        <p:sp>
+          <p:nvSpPr>
+            <p:cNvPr id="12" name="Rectangle 11"/>
+            <p:cNvSpPr/>
+            <p:nvPr/>
+          </p:nvSpPr>
+          <p:spPr>
+            <a:xfrm>
+              <a:off x="11950995" y="552893"/>
+              <a:ext cx="241005" cy="659219"/>
+            </a:xfrm>
+            <a:prstGeom prst="rect">
+              <a:avLst/>
+            </a:prstGeom>
+            <a:solidFill>
+              <a:schemeClr val="tx1"/>
+            </a:solidFill>
+            <a:ln>
+              <a:noFill/>
+            </a:ln>
+          </p:spPr>
+          <p:style>
+            <a:lnRef idx="2">
+              <a:schemeClr val="accent1">
+                <a:shade val="50000"/>
+              </a:schemeClr>
+            </a:lnRef>
+            <a:fillRef idx="1">
+              <a:schemeClr val="accent1"/>
+            </a:fillRef>
+            <a:effectRef idx="0">
+              <a:schemeClr val="accent1"/>
+            </a:effectRef>
+            <a:fontRef idx="minor">
+              <a:schemeClr val="lt1"/>
+            </a:fontRef>
+          </p:style>
+          <p:txBody>
+            <a:bodyPr rtlCol="0" anchor="ctr"/>
+            <a:lstStyle/>
+            <a:p>
+              <a:pPr algn="ctr"/>
+              <a:endParaRPr lang="en-US"/>
+            </a:p>
+          </p:txBody>
+        </p:sp>
+        <p:pic>
+          <p:nvPicPr>
+            <p:cNvPr id="13" name="Picture 12"/>
+            <p:cNvPicPr>
+              <a:picLocks noChangeAspect="1"/>
+            </p:cNvPicPr>
+            <p:nvPr/>
+          </p:nvPicPr>
+          <p:blipFill>
+            <a:blip r:embed="rId2" cstate="screen">
+              <a:extLst>
+                <a:ext uri="{28A0092B-C50C-407E-A947-70E740481C1C}">
+                  <a14:useLocalDpi xmlns:a14="http://schemas.microsoft.com/office/drawing/2010/main"/>
+                </a:ext>
+              </a:extLst>
+            </a:blip>
+            <a:stretch>
+              <a:fillRect/>
+            </a:stretch>
+          </p:blipFill>
+          <p:spPr>
+            <a:xfrm rot="5400000">
+              <a:off x="11829714" y="828836"/>
+              <a:ext cx="506509" cy="139290"/>
+            </a:xfrm>
+            <a:prstGeom prst="rect">
+              <a:avLst/>
+            </a:prstGeom>
+          </p:spPr>
+        </p:pic>
+      </p:grpSp>
+      <p:cxnSp>
+        <p:nvCxnSpPr>
+          <p:cNvPr id="14" name="Straight Connector 13"/>
+          <p:cNvCxnSpPr/>
+          <p:nvPr userDrawn="1"/>
+        </p:nvCxnSpPr>
+        <p:spPr>
+          <a:xfrm>
+            <a:off x="5635357" y="3538611"/>
+            <a:ext cx="900000" cy="0"/>
+          </a:xfrm>
+          <a:prstGeom prst="line">
+            <a:avLst/>
+          </a:prstGeom>
+          <a:ln w="25400">
+            <a:solidFill>
+              <a:schemeClr val="tx1"/>
+            </a:solidFill>
+          </a:ln>
+        </p:spPr>
+        <p:style>
+          <a:lnRef idx="1">
+            <a:schemeClr val="accent1"/>
+          </a:lnRef>
+          <a:fillRef idx="0">
+            <a:schemeClr val="accent1"/>
+          </a:fillRef>
+          <a:effectRef idx="0">
+            <a:schemeClr val="accent1"/>
+          </a:effectRef>
+          <a:fontRef idx="minor">
+            <a:schemeClr val="tx1"/>
+          </a:fontRef>
+        </p:style>
+      </p:cxnSp>
+    </p:spTree>
+    <p:extLst>
+      <p:ext uri="{BB962C8B-B14F-4D97-AF65-F5344CB8AC3E}">
+        <p14:creationId xmlns:p14="http://schemas.microsoft.com/office/powerpoint/2010/main" val="1191893233"/>
+      </p:ext>
+    </p:extLst>
+  </p:cSld>
+  <p:clrMapOvr>
+    <a:masterClrMapping/>
+  </p:clrMapOvr>
+</p:sldLayout>
+</file>
+
+<file path=ppt/slideLayouts/slideLayout21.xml><?xml version="1.0" encoding="utf-8"?>
 <p:sldLayout xmlns:a="http://schemas.openxmlformats.org/drawingml/2006/main" xmlns:r="http://schemas.openxmlformats.org/officeDocument/2006/relationships" xmlns:p="http://schemas.openxmlformats.org/presentationml/2006/main" preserve="1" userDrawn="1">
   <p:cSld name="Første steg">
     <p:spTree>
@@ -4467,7 +4872,7 @@
 </p:sldLayout>
 </file>
 
-<file path=ppt/slideLayouts/slideLayout21.xml><?xml version="1.0" encoding="utf-8"?>
+<file path=ppt/slideLayouts/slideLayout22.xml><?xml version="1.0" encoding="utf-8"?>
 <p:sldLayout xmlns:a="http://schemas.openxmlformats.org/drawingml/2006/main" xmlns:r="http://schemas.openxmlformats.org/officeDocument/2006/relationships" xmlns:p="http://schemas.openxmlformats.org/presentationml/2006/main" preserve="1" userDrawn="1">
   <p:cSld name="Mellomsteg tekst og bilde">
     <p:spTree>
@@ -4770,7 +5175,7 @@
 </p:sldLayout>
 </file>
 
-<file path=ppt/slideLayouts/slideLayout22.xml><?xml version="1.0" encoding="utf-8"?>
+<file path=ppt/slideLayouts/slideLayout23.xml><?xml version="1.0" encoding="utf-8"?>
 <p:sldLayout xmlns:a="http://schemas.openxmlformats.org/drawingml/2006/main" xmlns:r="http://schemas.openxmlformats.org/officeDocument/2006/relationships" xmlns:p="http://schemas.openxmlformats.org/presentationml/2006/main" preserve="1" userDrawn="1">
   <p:cSld name="Mellomsteg bare tittel">
     <p:spTree>
@@ -4958,7 +5363,7 @@
 </p:sldLayout>
 </file>
 
-<file path=ppt/slideLayouts/slideLayout23.xml><?xml version="1.0" encoding="utf-8"?>
+<file path=ppt/slideLayouts/slideLayout24.xml><?xml version="1.0" encoding="utf-8"?>
 <p:sldLayout xmlns:a="http://schemas.openxmlformats.org/drawingml/2006/main" xmlns:r="http://schemas.openxmlformats.org/officeDocument/2006/relationships" xmlns:p="http://schemas.openxmlformats.org/presentationml/2006/main" preserve="1" userDrawn="1">
   <p:cSld name="Mellomsteg tre bilder">
     <p:spTree>
@@ -5463,7 +5868,7 @@
 </p:sldLayout>
 </file>
 
-<file path=ppt/slideLayouts/slideLayout24.xml><?xml version="1.0" encoding="utf-8"?>
+<file path=ppt/slideLayouts/slideLayout25.xml><?xml version="1.0" encoding="utf-8"?>
 <p:sldLayout xmlns:a="http://schemas.openxmlformats.org/drawingml/2006/main" xmlns:r="http://schemas.openxmlformats.org/officeDocument/2006/relationships" xmlns:p="http://schemas.openxmlformats.org/presentationml/2006/main" preserve="1" userDrawn="1">
   <p:cSld name="Siste steg">
     <p:spTree>
@@ -8586,7 +8991,7 @@
             <p:nvPr/>
           </p:nvPicPr>
           <p:blipFill>
-            <a:blip r:embed="rId15" cstate="screen">
+            <a:blip r:embed="rId16" cstate="screen">
               <a:extLst>
                 <a:ext uri="{28A0092B-C50C-407E-A947-70E740481C1C}">
                   <a14:useLocalDpi xmlns:a14="http://schemas.microsoft.com/office/drawing/2010/main"/>
@@ -8696,6 +9101,7 @@
     <p:sldLayoutId id="2147483704" r:id="rId11"/>
     <p:sldLayoutId id="2147483710" r:id="rId12"/>
     <p:sldLayoutId id="2147483693" r:id="rId13"/>
+    <p:sldLayoutId id="2147483713" r:id="rId14"/>
   </p:sldLayoutIdLst>
   <p:txStyles>
     <p:titleStyle>
@@ -9638,45 +10044,7 @@
       </p:grpSpPr>
       <p:sp>
         <p:nvSpPr>
-          <p:cNvPr id="2" name="Content Placeholder 1"/>
-          <p:cNvSpPr>
-            <a:spLocks noGrp="1"/>
-          </p:cNvSpPr>
-          <p:nvPr>
-            <p:ph idx="1"/>
-          </p:nvPr>
-        </p:nvSpPr>
-        <p:spPr/>
-        <p:txBody>
-          <a:bodyPr/>
-          <a:lstStyle/>
-          <a:p>
-            <a:r>
-              <a:rPr lang="nb-NO" dirty="0"/>
-              <a:t>Representerer en operasjon som skal utføres på alle objekter i en objekt-struktur</a:t>
-            </a:r>
-            <a:r>
-              <a:rPr lang="nb-NO" dirty="0" smtClean="0"/>
-              <a:t>.</a:t>
-            </a:r>
-          </a:p>
-          <a:p>
-            <a:r>
-              <a:rPr lang="nb-NO" dirty="0"/>
-              <a:t>Med Visitor kan man legge til nye operasjoner uten å endre på klassene i objekt-strukturen.</a:t>
-            </a:r>
-          </a:p>
-          <a:p>
-            <a:pPr marL="357187" lvl="1" indent="0">
-              <a:buNone/>
-            </a:pPr>
-            <a:endParaRPr lang="nb-NO" dirty="0"/>
-          </a:p>
-        </p:txBody>
-      </p:sp>
-      <p:sp>
-        <p:nvSpPr>
-          <p:cNvPr id="3" name="Title 2"/>
+          <p:cNvPr id="5" name="Tittel 4"/>
           <p:cNvSpPr>
             <a:spLocks noGrp="1"/>
           </p:cNvSpPr>
@@ -9691,7 +10059,46 @@
           <a:p>
             <a:r>
               <a:rPr lang="nb-NO" dirty="0" smtClean="0"/>
-              <a:t>Visitor - hensikt</a:t>
+              <a:t>Visitor og </a:t>
+            </a:r>
+            <a:r>
+              <a:rPr lang="nb-NO" dirty="0" err="1" smtClean="0"/>
+              <a:t>Strategy</a:t>
+            </a:r>
+            <a:endParaRPr lang="nb-NO" dirty="0"/>
+          </a:p>
+        </p:txBody>
+      </p:sp>
+      <p:sp>
+        <p:nvSpPr>
+          <p:cNvPr id="6" name="Undertittel 5"/>
+          <p:cNvSpPr>
+            <a:spLocks noGrp="1"/>
+          </p:cNvSpPr>
+          <p:nvPr>
+            <p:ph type="subTitle" idx="1"/>
+          </p:nvPr>
+        </p:nvSpPr>
+        <p:spPr/>
+        <p:txBody>
+          <a:bodyPr/>
+          <a:lstStyle/>
+          <a:p>
+            <a:r>
+              <a:rPr lang="nb-NO" dirty="0" smtClean="0"/>
+              <a:t>Systemutviklerskolen: </a:t>
+            </a:r>
+            <a:r>
+              <a:rPr lang="nb-NO" dirty="0" err="1" smtClean="0"/>
+              <a:t>Hands-on</a:t>
+            </a:r>
+            <a:r>
+              <a:rPr lang="nb-NO" dirty="0" smtClean="0"/>
+              <a:t> design </a:t>
+            </a:r>
+            <a:r>
+              <a:rPr lang="nb-NO" dirty="0" err="1" smtClean="0"/>
+              <a:t>patterns</a:t>
             </a:r>
             <a:endParaRPr lang="nb-NO" dirty="0"/>
           </a:p>
@@ -9700,7 +10107,7 @@
     </p:spTree>
     <p:extLst>
       <p:ext uri="{BB962C8B-B14F-4D97-AF65-F5344CB8AC3E}">
-        <p14:creationId xmlns:p14="http://schemas.microsoft.com/office/powerpoint/2010/main" val="2302386445"/>
+        <p14:creationId xmlns:p14="http://schemas.microsoft.com/office/powerpoint/2010/main" val="2166879095"/>
       </p:ext>
     </p:extLst>
   </p:cSld>
@@ -9710,492 +10117,14 @@
   <p:timing>
     <p:tnLst>
       <p:par>
-        <p:cTn id="1" dur="indefinite" restart="never" nodeType="tmRoot">
-          <p:childTnLst>
-            <p:seq concurrent="1" nextAc="seek">
-              <p:cTn id="2" dur="indefinite" nodeType="mainSeq">
-                <p:childTnLst>
-                  <p:par>
-                    <p:cTn id="3" fill="hold">
-                      <p:stCondLst>
-                        <p:cond delay="indefinite"/>
-                      </p:stCondLst>
-                      <p:childTnLst>
-                        <p:par>
-                          <p:cTn id="4" fill="hold">
-                            <p:stCondLst>
-                              <p:cond delay="0"/>
-                            </p:stCondLst>
-                            <p:childTnLst>
-                              <p:par>
-                                <p:cTn id="5" presetID="1" presetClass="entr" presetSubtype="0" fill="hold" grpId="0" nodeType="clickEffect">
-                                  <p:stCondLst>
-                                    <p:cond delay="0"/>
-                                  </p:stCondLst>
-                                  <p:childTnLst>
-                                    <p:set>
-                                      <p:cBhvr>
-                                        <p:cTn id="6" dur="1" fill="hold">
-                                          <p:stCondLst>
-                                            <p:cond delay="0"/>
-                                          </p:stCondLst>
-                                        </p:cTn>
-                                        <p:tgtEl>
-                                          <p:spTgt spid="2">
-                                            <p:txEl>
-                                              <p:pRg st="0" end="0"/>
-                                            </p:txEl>
-                                          </p:spTgt>
-                                        </p:tgtEl>
-                                        <p:attrNameLst>
-                                          <p:attrName>style.visibility</p:attrName>
-                                        </p:attrNameLst>
-                                      </p:cBhvr>
-                                      <p:to>
-                                        <p:strVal val="visible"/>
-                                      </p:to>
-                                    </p:set>
-                                  </p:childTnLst>
-                                </p:cTn>
-                              </p:par>
-                            </p:childTnLst>
-                          </p:cTn>
-                        </p:par>
-                      </p:childTnLst>
-                    </p:cTn>
-                  </p:par>
-                  <p:par>
-                    <p:cTn id="7" fill="hold">
-                      <p:stCondLst>
-                        <p:cond delay="indefinite"/>
-                      </p:stCondLst>
-                      <p:childTnLst>
-                        <p:par>
-                          <p:cTn id="8" fill="hold">
-                            <p:stCondLst>
-                              <p:cond delay="0"/>
-                            </p:stCondLst>
-                            <p:childTnLst>
-                              <p:par>
-                                <p:cTn id="9" presetID="1" presetClass="entr" presetSubtype="0" fill="hold" grpId="0" nodeType="clickEffect">
-                                  <p:stCondLst>
-                                    <p:cond delay="0"/>
-                                  </p:stCondLst>
-                                  <p:childTnLst>
-                                    <p:set>
-                                      <p:cBhvr>
-                                        <p:cTn id="10" dur="1" fill="hold">
-                                          <p:stCondLst>
-                                            <p:cond delay="0"/>
-                                          </p:stCondLst>
-                                        </p:cTn>
-                                        <p:tgtEl>
-                                          <p:spTgt spid="2">
-                                            <p:txEl>
-                                              <p:pRg st="1" end="1"/>
-                                            </p:txEl>
-                                          </p:spTgt>
-                                        </p:tgtEl>
-                                        <p:attrNameLst>
-                                          <p:attrName>style.visibility</p:attrName>
-                                        </p:attrNameLst>
-                                      </p:cBhvr>
-                                      <p:to>
-                                        <p:strVal val="visible"/>
-                                      </p:to>
-                                    </p:set>
-                                  </p:childTnLst>
-                                </p:cTn>
-                              </p:par>
-                            </p:childTnLst>
-                          </p:cTn>
-                        </p:par>
-                      </p:childTnLst>
-                    </p:cTn>
-                  </p:par>
-                </p:childTnLst>
-              </p:cTn>
-              <p:prevCondLst>
-                <p:cond evt="onPrev" delay="0">
-                  <p:tgtEl>
-                    <p:sldTgt/>
-                  </p:tgtEl>
-                </p:cond>
-              </p:prevCondLst>
-              <p:nextCondLst>
-                <p:cond evt="onNext" delay="0">
-                  <p:tgtEl>
-                    <p:sldTgt/>
-                  </p:tgtEl>
-                </p:cond>
-              </p:nextCondLst>
-            </p:seq>
-          </p:childTnLst>
-        </p:cTn>
+        <p:cTn id="1" dur="indefinite" restart="never" nodeType="tmRoot"/>
       </p:par>
     </p:tnLst>
-    <p:bldLst>
-      <p:bldP spid="2" grpId="0" uiExpand="1" build="p"/>
-    </p:bldLst>
   </p:timing>
 </p:sld>
 </file>
 
-<file path=ppt/slides/slide2.xml><?xml version="1.0" encoding="utf-8"?>
-<p:sld xmlns:a="http://schemas.openxmlformats.org/drawingml/2006/main" xmlns:r="http://schemas.openxmlformats.org/officeDocument/2006/relationships" xmlns:p="http://schemas.openxmlformats.org/presentationml/2006/main">
-  <p:cSld>
-    <p:spTree>
-      <p:nvGrpSpPr>
-        <p:cNvPr id="1" name=""/>
-        <p:cNvGrpSpPr/>
-        <p:nvPr/>
-      </p:nvGrpSpPr>
-      <p:grpSpPr>
-        <a:xfrm>
-          <a:off x="0" y="0"/>
-          <a:ext cx="0" cy="0"/>
-          <a:chOff x="0" y="0"/>
-          <a:chExt cx="0" cy="0"/>
-        </a:xfrm>
-      </p:grpSpPr>
-      <p:sp>
-        <p:nvSpPr>
-          <p:cNvPr id="2" name="Content Placeholder 1"/>
-          <p:cNvSpPr>
-            <a:spLocks noGrp="1"/>
-          </p:cNvSpPr>
-          <p:nvPr>
-            <p:ph idx="1"/>
-          </p:nvPr>
-        </p:nvSpPr>
-        <p:spPr/>
-        <p:txBody>
-          <a:bodyPr/>
-          <a:lstStyle/>
-          <a:p>
-            <a:r>
-              <a:rPr lang="nb-NO" dirty="0"/>
-              <a:t>Man har en objekt-struktur som består av ulike typer (klasser), og man ønsker å traversere gjennom elementene for å utføre en operasjon som er implementert ulikt for de ulike typene.</a:t>
-            </a:r>
-          </a:p>
-          <a:p>
-            <a:r>
-              <a:rPr lang="nb-NO" dirty="0"/>
-              <a:t>En måte å løse problemet på er ved å bruke arv, hvor hver sub-type implementerer sin variant av operasjonen.</a:t>
-            </a:r>
-          </a:p>
-          <a:p>
-            <a:pPr lvl="1"/>
-            <a:r>
-              <a:rPr lang="nb-NO" dirty="0"/>
-              <a:t>Dette kan medføre brudd på Single-</a:t>
-            </a:r>
-            <a:r>
-              <a:rPr lang="nb-NO" dirty="0" err="1"/>
-              <a:t>responsibility</a:t>
-            </a:r>
-            <a:r>
-              <a:rPr lang="nb-NO" dirty="0"/>
-              <a:t> prinsippet da operasjonen ikke nødvendigvis hører hjemme i klassen, og bare er aktuell </a:t>
-            </a:r>
-            <a:r>
-              <a:rPr lang="nb-NO" dirty="0" err="1"/>
-              <a:t>ifm</a:t>
-            </a:r>
-            <a:r>
-              <a:rPr lang="nb-NO" dirty="0"/>
-              <a:t> traverseringen.</a:t>
-            </a:r>
-          </a:p>
-          <a:p>
-            <a:pPr lvl="1"/>
-            <a:r>
-              <a:rPr lang="nb-NO" dirty="0"/>
-              <a:t>Dersom det blir behov for en ny type operasjon, må alle klassene implementere denne, som er et brudd på Open/</a:t>
-            </a:r>
-            <a:r>
-              <a:rPr lang="nb-NO" dirty="0" err="1"/>
-              <a:t>Closed</a:t>
-            </a:r>
-            <a:r>
-              <a:rPr lang="nb-NO" dirty="0"/>
-              <a:t> prinsippet.</a:t>
-            </a:r>
-          </a:p>
-          <a:p>
-            <a:pPr marL="0" indent="0">
-              <a:buNone/>
-            </a:pPr>
-            <a:endParaRPr lang="nb-NO" dirty="0"/>
-          </a:p>
-        </p:txBody>
-      </p:sp>
-      <p:sp>
-        <p:nvSpPr>
-          <p:cNvPr id="3" name="Title 2"/>
-          <p:cNvSpPr>
-            <a:spLocks noGrp="1"/>
-          </p:cNvSpPr>
-          <p:nvPr>
-            <p:ph type="title"/>
-          </p:nvPr>
-        </p:nvSpPr>
-        <p:spPr/>
-        <p:txBody>
-          <a:bodyPr/>
-          <a:lstStyle/>
-          <a:p>
-            <a:r>
-              <a:rPr lang="nb-NO" dirty="0" smtClean="0"/>
-              <a:t>Visitor - bakgrunn</a:t>
-            </a:r>
-            <a:endParaRPr lang="nb-NO" dirty="0"/>
-          </a:p>
-        </p:txBody>
-      </p:sp>
-    </p:spTree>
-    <p:extLst>
-      <p:ext uri="{BB962C8B-B14F-4D97-AF65-F5344CB8AC3E}">
-        <p14:creationId xmlns:p14="http://schemas.microsoft.com/office/powerpoint/2010/main" val="697017918"/>
-      </p:ext>
-    </p:extLst>
-  </p:cSld>
-  <p:clrMapOvr>
-    <a:masterClrMapping/>
-  </p:clrMapOvr>
-  <p:timing>
-    <p:tnLst>
-      <p:par>
-        <p:cTn id="1" dur="indefinite" restart="never" nodeType="tmRoot">
-          <p:childTnLst>
-            <p:seq concurrent="1" nextAc="seek">
-              <p:cTn id="2" dur="indefinite" nodeType="mainSeq">
-                <p:childTnLst>
-                  <p:par>
-                    <p:cTn id="3" fill="hold">
-                      <p:stCondLst>
-                        <p:cond delay="indefinite"/>
-                      </p:stCondLst>
-                      <p:childTnLst>
-                        <p:par>
-                          <p:cTn id="4" fill="hold">
-                            <p:stCondLst>
-                              <p:cond delay="0"/>
-                            </p:stCondLst>
-                            <p:childTnLst>
-                              <p:par>
-                                <p:cTn id="5" presetID="1" presetClass="entr" presetSubtype="0" fill="hold" grpId="0" nodeType="clickEffect">
-                                  <p:stCondLst>
-                                    <p:cond delay="0"/>
-                                  </p:stCondLst>
-                                  <p:childTnLst>
-                                    <p:set>
-                                      <p:cBhvr>
-                                        <p:cTn id="6" dur="1" fill="hold">
-                                          <p:stCondLst>
-                                            <p:cond delay="0"/>
-                                          </p:stCondLst>
-                                        </p:cTn>
-                                        <p:tgtEl>
-                                          <p:spTgt spid="2">
-                                            <p:txEl>
-                                              <p:pRg st="0" end="0"/>
-                                            </p:txEl>
-                                          </p:spTgt>
-                                        </p:tgtEl>
-                                        <p:attrNameLst>
-                                          <p:attrName>style.visibility</p:attrName>
-                                        </p:attrNameLst>
-                                      </p:cBhvr>
-                                      <p:to>
-                                        <p:strVal val="visible"/>
-                                      </p:to>
-                                    </p:set>
-                                  </p:childTnLst>
-                                </p:cTn>
-                              </p:par>
-                            </p:childTnLst>
-                          </p:cTn>
-                        </p:par>
-                      </p:childTnLst>
-                    </p:cTn>
-                  </p:par>
-                  <p:par>
-                    <p:cTn id="7" fill="hold">
-                      <p:stCondLst>
-                        <p:cond delay="indefinite"/>
-                      </p:stCondLst>
-                      <p:childTnLst>
-                        <p:par>
-                          <p:cTn id="8" fill="hold">
-                            <p:stCondLst>
-                              <p:cond delay="0"/>
-                            </p:stCondLst>
-                            <p:childTnLst>
-                              <p:par>
-                                <p:cTn id="9" presetID="1" presetClass="entr" presetSubtype="0" fill="hold" grpId="0" nodeType="clickEffect">
-                                  <p:stCondLst>
-                                    <p:cond delay="0"/>
-                                  </p:stCondLst>
-                                  <p:childTnLst>
-                                    <p:set>
-                                      <p:cBhvr>
-                                        <p:cTn id="10" dur="1" fill="hold">
-                                          <p:stCondLst>
-                                            <p:cond delay="0"/>
-                                          </p:stCondLst>
-                                        </p:cTn>
-                                        <p:tgtEl>
-                                          <p:spTgt spid="2">
-                                            <p:txEl>
-                                              <p:pRg st="1" end="1"/>
-                                            </p:txEl>
-                                          </p:spTgt>
-                                        </p:tgtEl>
-                                        <p:attrNameLst>
-                                          <p:attrName>style.visibility</p:attrName>
-                                        </p:attrNameLst>
-                                      </p:cBhvr>
-                                      <p:to>
-                                        <p:strVal val="visible"/>
-                                      </p:to>
-                                    </p:set>
-                                  </p:childTnLst>
-                                </p:cTn>
-                              </p:par>
-                            </p:childTnLst>
-                          </p:cTn>
-                        </p:par>
-                      </p:childTnLst>
-                    </p:cTn>
-                  </p:par>
-                  <p:par>
-                    <p:cTn id="11" fill="hold">
-                      <p:stCondLst>
-                        <p:cond delay="indefinite"/>
-                      </p:stCondLst>
-                      <p:childTnLst>
-                        <p:par>
-                          <p:cTn id="12" fill="hold">
-                            <p:stCondLst>
-                              <p:cond delay="0"/>
-                            </p:stCondLst>
-                            <p:childTnLst>
-                              <p:par>
-                                <p:cTn id="13" presetID="1" presetClass="entr" presetSubtype="0" fill="hold" grpId="0" nodeType="clickEffect">
-                                  <p:stCondLst>
-                                    <p:cond delay="0"/>
-                                  </p:stCondLst>
-                                  <p:childTnLst>
-                                    <p:set>
-                                      <p:cBhvr>
-                                        <p:cTn id="14" dur="1" fill="hold">
-                                          <p:stCondLst>
-                                            <p:cond delay="0"/>
-                                          </p:stCondLst>
-                                        </p:cTn>
-                                        <p:tgtEl>
-                                          <p:spTgt spid="2">
-                                            <p:txEl>
-                                              <p:pRg st="2" end="2"/>
-                                            </p:txEl>
-                                          </p:spTgt>
-                                        </p:tgtEl>
-                                        <p:attrNameLst>
-                                          <p:attrName>style.visibility</p:attrName>
-                                        </p:attrNameLst>
-                                      </p:cBhvr>
-                                      <p:to>
-                                        <p:strVal val="visible"/>
-                                      </p:to>
-                                    </p:set>
-                                  </p:childTnLst>
-                                </p:cTn>
-                              </p:par>
-                            </p:childTnLst>
-                          </p:cTn>
-                        </p:par>
-                      </p:childTnLst>
-                    </p:cTn>
-                  </p:par>
-                  <p:par>
-                    <p:cTn id="15" fill="hold">
-                      <p:stCondLst>
-                        <p:cond delay="indefinite"/>
-                      </p:stCondLst>
-                      <p:childTnLst>
-                        <p:par>
-                          <p:cTn id="16" fill="hold">
-                            <p:stCondLst>
-                              <p:cond delay="0"/>
-                            </p:stCondLst>
-                            <p:childTnLst>
-                              <p:par>
-                                <p:cTn id="17" presetID="1" presetClass="entr" presetSubtype="0" fill="hold" grpId="0" nodeType="clickEffect">
-                                  <p:stCondLst>
-                                    <p:cond delay="0"/>
-                                  </p:stCondLst>
-                                  <p:childTnLst>
-                                    <p:set>
-                                      <p:cBhvr>
-                                        <p:cTn id="18" dur="1" fill="hold">
-                                          <p:stCondLst>
-                                            <p:cond delay="0"/>
-                                          </p:stCondLst>
-                                        </p:cTn>
-                                        <p:tgtEl>
-                                          <p:spTgt spid="2">
-                                            <p:txEl>
-                                              <p:pRg st="3" end="3"/>
-                                            </p:txEl>
-                                          </p:spTgt>
-                                        </p:tgtEl>
-                                        <p:attrNameLst>
-                                          <p:attrName>style.visibility</p:attrName>
-                                        </p:attrNameLst>
-                                      </p:cBhvr>
-                                      <p:to>
-                                        <p:strVal val="visible"/>
-                                      </p:to>
-                                    </p:set>
-                                  </p:childTnLst>
-                                </p:cTn>
-                              </p:par>
-                            </p:childTnLst>
-                          </p:cTn>
-                        </p:par>
-                      </p:childTnLst>
-                    </p:cTn>
-                  </p:par>
-                </p:childTnLst>
-              </p:cTn>
-              <p:prevCondLst>
-                <p:cond evt="onPrev" delay="0">
-                  <p:tgtEl>
-                    <p:sldTgt/>
-                  </p:tgtEl>
-                </p:cond>
-              </p:prevCondLst>
-              <p:nextCondLst>
-                <p:cond evt="onNext" delay="0">
-                  <p:tgtEl>
-                    <p:sldTgt/>
-                  </p:tgtEl>
-                </p:cond>
-              </p:nextCondLst>
-            </p:seq>
-          </p:childTnLst>
-        </p:cTn>
-      </p:par>
-    </p:tnLst>
-    <p:bldLst>
-      <p:bldP spid="2" grpId="0" uiExpand="1" build="p"/>
-    </p:bldLst>
-  </p:timing>
-</p:sld>
-</file>
-
-<file path=ppt/slides/slide3.xml><?xml version="1.0" encoding="utf-8"?>
+<file path=ppt/slides/slide10.xml><?xml version="1.0" encoding="utf-8"?>
 <p:sld xmlns:a="http://schemas.openxmlformats.org/drawingml/2006/main" xmlns:r="http://schemas.openxmlformats.org/officeDocument/2006/relationships" xmlns:p="http://schemas.openxmlformats.org/presentationml/2006/main">
   <p:cSld>
     <p:spTree>
@@ -10245,7 +10174,7 @@
           <p:cNvPr id="6" name="Picture 2" descr="Visitor Pattern - UML Class Diagram">
             <a:extLst>
               <a:ext uri="{FF2B5EF4-FFF2-40B4-BE49-F238E27FC236}">
-                <a16:creationId xmlns:a16="http://schemas.microsoft.com/office/drawing/2014/main" xmlns="" id="{6ECB2638-78CB-4DAA-BB71-94163B2EB52E}"/>
+                <a16:creationId xmlns="" xmlns:a16="http://schemas.microsoft.com/office/drawing/2014/main" id="{6ECB2638-78CB-4DAA-BB71-94163B2EB52E}"/>
               </a:ext>
             </a:extLst>
           </p:cNvPr>
@@ -10307,7 +10236,7 @@
 </p:sld>
 </file>
 
-<file path=ppt/slides/slide4.xml><?xml version="1.0" encoding="utf-8"?>
+<file path=ppt/slides/slide11.xml><?xml version="1.0" encoding="utf-8"?>
 <p:sld xmlns:a="http://schemas.openxmlformats.org/drawingml/2006/main" xmlns:r="http://schemas.openxmlformats.org/officeDocument/2006/relationships" xmlns:p="http://schemas.openxmlformats.org/presentationml/2006/main">
   <p:cSld>
     <p:spTree>
@@ -10388,7 +10317,7 @@
           <p:cNvPr id="5" name="Rektangel 1">
             <a:extLst>
               <a:ext uri="{FF2B5EF4-FFF2-40B4-BE49-F238E27FC236}">
-                <a16:creationId xmlns:a16="http://schemas.microsoft.com/office/drawing/2014/main" xmlns="" id="{3BEF0AC1-9401-4053-82E5-96A4AC358384}"/>
+                <a16:creationId xmlns="" xmlns:a16="http://schemas.microsoft.com/office/drawing/2014/main" id="{3BEF0AC1-9401-4053-82E5-96A4AC358384}"/>
               </a:ext>
             </a:extLst>
           </p:cNvPr>
@@ -11884,7 +11813,7 @@
 </p:sld>
 </file>
 
-<file path=ppt/slides/slide5.xml><?xml version="1.0" encoding="utf-8"?>
+<file path=ppt/slides/slide12.xml><?xml version="1.0" encoding="utf-8"?>
 <p:sld xmlns:a="http://schemas.openxmlformats.org/drawingml/2006/main" xmlns:r="http://schemas.openxmlformats.org/officeDocument/2006/relationships" xmlns:p="http://schemas.openxmlformats.org/presentationml/2006/main">
   <p:cSld>
     <p:spTree>
@@ -11965,7 +11894,7 @@
           <p:cNvPr id="7" name="Rektangel 1">
             <a:extLst>
               <a:ext uri="{FF2B5EF4-FFF2-40B4-BE49-F238E27FC236}">
-                <a16:creationId xmlns:a16="http://schemas.microsoft.com/office/drawing/2014/main" xmlns="" id="{63988271-58E0-4D95-9B6F-CBA92D24F708}"/>
+                <a16:creationId xmlns="" xmlns:a16="http://schemas.microsoft.com/office/drawing/2014/main" id="{63988271-58E0-4D95-9B6F-CBA92D24F708}"/>
               </a:ext>
             </a:extLst>
           </p:cNvPr>
@@ -13232,7 +13161,7 @@
 </p:sld>
 </file>
 
-<file path=ppt/slides/slide6.xml><?xml version="1.0" encoding="utf-8"?>
+<file path=ppt/slides/slide13.xml><?xml version="1.0" encoding="utf-8"?>
 <p:sld xmlns:a="http://schemas.openxmlformats.org/drawingml/2006/main" xmlns:r="http://schemas.openxmlformats.org/officeDocument/2006/relationships" xmlns:p="http://schemas.openxmlformats.org/presentationml/2006/main">
   <p:cSld>
     <p:spTree>
@@ -13313,7 +13242,7 @@
           <p:cNvPr id="5" name="Rektangel 1">
             <a:extLst>
               <a:ext uri="{FF2B5EF4-FFF2-40B4-BE49-F238E27FC236}">
-                <a16:creationId xmlns:a16="http://schemas.microsoft.com/office/drawing/2014/main" xmlns="" id="{FA736312-75CA-4887-9F29-9AF851C77593}"/>
+                <a16:creationId xmlns="" xmlns:a16="http://schemas.microsoft.com/office/drawing/2014/main" id="{FA736312-75CA-4887-9F29-9AF851C77593}"/>
               </a:ext>
             </a:extLst>
           </p:cNvPr>
@@ -14700,7 +14629,7 @@
 </p:sld>
 </file>
 
-<file path=ppt/slides/slide7.xml><?xml version="1.0" encoding="utf-8"?>
+<file path=ppt/slides/slide14.xml><?xml version="1.0" encoding="utf-8"?>
 <p:sld xmlns:a="http://schemas.openxmlformats.org/drawingml/2006/main" xmlns:r="http://schemas.openxmlformats.org/officeDocument/2006/relationships" xmlns:p="http://schemas.openxmlformats.org/presentationml/2006/main">
   <p:cSld>
     <p:spTree>
@@ -14842,6 +14771,2079 @@
     <p:extLst>
       <p:ext uri="{BB962C8B-B14F-4D97-AF65-F5344CB8AC3E}">
         <p14:creationId xmlns:p14="http://schemas.microsoft.com/office/powerpoint/2010/main" val="771176593"/>
+      </p:ext>
+    </p:extLst>
+  </p:cSld>
+  <p:clrMapOvr>
+    <a:masterClrMapping/>
+  </p:clrMapOvr>
+  <p:timing>
+    <p:tnLst>
+      <p:par>
+        <p:cTn id="1" dur="indefinite" restart="never" nodeType="tmRoot">
+          <p:childTnLst>
+            <p:seq concurrent="1" nextAc="seek">
+              <p:cTn id="2" dur="indefinite" nodeType="mainSeq">
+                <p:childTnLst>
+                  <p:par>
+                    <p:cTn id="3" fill="hold">
+                      <p:stCondLst>
+                        <p:cond delay="indefinite"/>
+                      </p:stCondLst>
+                      <p:childTnLst>
+                        <p:par>
+                          <p:cTn id="4" fill="hold">
+                            <p:stCondLst>
+                              <p:cond delay="0"/>
+                            </p:stCondLst>
+                            <p:childTnLst>
+                              <p:par>
+                                <p:cTn id="5" presetID="1" presetClass="entr" presetSubtype="0" fill="hold" grpId="0" nodeType="clickEffect">
+                                  <p:stCondLst>
+                                    <p:cond delay="0"/>
+                                  </p:stCondLst>
+                                  <p:childTnLst>
+                                    <p:set>
+                                      <p:cBhvr>
+                                        <p:cTn id="6" dur="1" fill="hold">
+                                          <p:stCondLst>
+                                            <p:cond delay="0"/>
+                                          </p:stCondLst>
+                                        </p:cTn>
+                                        <p:tgtEl>
+                                          <p:spTgt spid="2">
+                                            <p:txEl>
+                                              <p:pRg st="0" end="0"/>
+                                            </p:txEl>
+                                          </p:spTgt>
+                                        </p:tgtEl>
+                                        <p:attrNameLst>
+                                          <p:attrName>style.visibility</p:attrName>
+                                        </p:attrNameLst>
+                                      </p:cBhvr>
+                                      <p:to>
+                                        <p:strVal val="visible"/>
+                                      </p:to>
+                                    </p:set>
+                                  </p:childTnLst>
+                                </p:cTn>
+                              </p:par>
+                            </p:childTnLst>
+                          </p:cTn>
+                        </p:par>
+                      </p:childTnLst>
+                    </p:cTn>
+                  </p:par>
+                  <p:par>
+                    <p:cTn id="7" fill="hold">
+                      <p:stCondLst>
+                        <p:cond delay="indefinite"/>
+                      </p:stCondLst>
+                      <p:childTnLst>
+                        <p:par>
+                          <p:cTn id="8" fill="hold">
+                            <p:stCondLst>
+                              <p:cond delay="0"/>
+                            </p:stCondLst>
+                            <p:childTnLst>
+                              <p:par>
+                                <p:cTn id="9" presetID="1" presetClass="entr" presetSubtype="0" fill="hold" grpId="0" nodeType="clickEffect">
+                                  <p:stCondLst>
+                                    <p:cond delay="0"/>
+                                  </p:stCondLst>
+                                  <p:childTnLst>
+                                    <p:set>
+                                      <p:cBhvr>
+                                        <p:cTn id="10" dur="1" fill="hold">
+                                          <p:stCondLst>
+                                            <p:cond delay="0"/>
+                                          </p:stCondLst>
+                                        </p:cTn>
+                                        <p:tgtEl>
+                                          <p:spTgt spid="2">
+                                            <p:txEl>
+                                              <p:pRg st="1" end="1"/>
+                                            </p:txEl>
+                                          </p:spTgt>
+                                        </p:tgtEl>
+                                        <p:attrNameLst>
+                                          <p:attrName>style.visibility</p:attrName>
+                                        </p:attrNameLst>
+                                      </p:cBhvr>
+                                      <p:to>
+                                        <p:strVal val="visible"/>
+                                      </p:to>
+                                    </p:set>
+                                  </p:childTnLst>
+                                </p:cTn>
+                              </p:par>
+                            </p:childTnLst>
+                          </p:cTn>
+                        </p:par>
+                      </p:childTnLst>
+                    </p:cTn>
+                  </p:par>
+                  <p:par>
+                    <p:cTn id="11" fill="hold">
+                      <p:stCondLst>
+                        <p:cond delay="indefinite"/>
+                      </p:stCondLst>
+                      <p:childTnLst>
+                        <p:par>
+                          <p:cTn id="12" fill="hold">
+                            <p:stCondLst>
+                              <p:cond delay="0"/>
+                            </p:stCondLst>
+                            <p:childTnLst>
+                              <p:par>
+                                <p:cTn id="13" presetID="1" presetClass="entr" presetSubtype="0" fill="hold" grpId="0" nodeType="clickEffect">
+                                  <p:stCondLst>
+                                    <p:cond delay="0"/>
+                                  </p:stCondLst>
+                                  <p:childTnLst>
+                                    <p:set>
+                                      <p:cBhvr>
+                                        <p:cTn id="14" dur="1" fill="hold">
+                                          <p:stCondLst>
+                                            <p:cond delay="0"/>
+                                          </p:stCondLst>
+                                        </p:cTn>
+                                        <p:tgtEl>
+                                          <p:spTgt spid="2">
+                                            <p:txEl>
+                                              <p:pRg st="2" end="2"/>
+                                            </p:txEl>
+                                          </p:spTgt>
+                                        </p:tgtEl>
+                                        <p:attrNameLst>
+                                          <p:attrName>style.visibility</p:attrName>
+                                        </p:attrNameLst>
+                                      </p:cBhvr>
+                                      <p:to>
+                                        <p:strVal val="visible"/>
+                                      </p:to>
+                                    </p:set>
+                                  </p:childTnLst>
+                                </p:cTn>
+                              </p:par>
+                            </p:childTnLst>
+                          </p:cTn>
+                        </p:par>
+                      </p:childTnLst>
+                    </p:cTn>
+                  </p:par>
+                  <p:par>
+                    <p:cTn id="15" fill="hold">
+                      <p:stCondLst>
+                        <p:cond delay="indefinite"/>
+                      </p:stCondLst>
+                      <p:childTnLst>
+                        <p:par>
+                          <p:cTn id="16" fill="hold">
+                            <p:stCondLst>
+                              <p:cond delay="0"/>
+                            </p:stCondLst>
+                            <p:childTnLst>
+                              <p:par>
+                                <p:cTn id="17" presetID="1" presetClass="entr" presetSubtype="0" fill="hold" grpId="0" nodeType="clickEffect">
+                                  <p:stCondLst>
+                                    <p:cond delay="0"/>
+                                  </p:stCondLst>
+                                  <p:childTnLst>
+                                    <p:set>
+                                      <p:cBhvr>
+                                        <p:cTn id="18" dur="1" fill="hold">
+                                          <p:stCondLst>
+                                            <p:cond delay="0"/>
+                                          </p:stCondLst>
+                                        </p:cTn>
+                                        <p:tgtEl>
+                                          <p:spTgt spid="2">
+                                            <p:txEl>
+                                              <p:pRg st="3" end="3"/>
+                                            </p:txEl>
+                                          </p:spTgt>
+                                        </p:tgtEl>
+                                        <p:attrNameLst>
+                                          <p:attrName>style.visibility</p:attrName>
+                                        </p:attrNameLst>
+                                      </p:cBhvr>
+                                      <p:to>
+                                        <p:strVal val="visible"/>
+                                      </p:to>
+                                    </p:set>
+                                  </p:childTnLst>
+                                </p:cTn>
+                              </p:par>
+                            </p:childTnLst>
+                          </p:cTn>
+                        </p:par>
+                      </p:childTnLst>
+                    </p:cTn>
+                  </p:par>
+                </p:childTnLst>
+              </p:cTn>
+              <p:prevCondLst>
+                <p:cond evt="onPrev" delay="0">
+                  <p:tgtEl>
+                    <p:sldTgt/>
+                  </p:tgtEl>
+                </p:cond>
+              </p:prevCondLst>
+              <p:nextCondLst>
+                <p:cond evt="onNext" delay="0">
+                  <p:tgtEl>
+                    <p:sldTgt/>
+                  </p:tgtEl>
+                </p:cond>
+              </p:nextCondLst>
+            </p:seq>
+          </p:childTnLst>
+        </p:cTn>
+      </p:par>
+    </p:tnLst>
+    <p:bldLst>
+      <p:bldP spid="2" grpId="0" uiExpand="1" build="p"/>
+    </p:bldLst>
+  </p:timing>
+</p:sld>
+</file>
+
+<file path=ppt/slides/slide15.xml><?xml version="1.0" encoding="utf-8"?>
+<p:sld xmlns:a="http://schemas.openxmlformats.org/drawingml/2006/main" xmlns:r="http://schemas.openxmlformats.org/officeDocument/2006/relationships" xmlns:p="http://schemas.openxmlformats.org/presentationml/2006/main">
+  <p:cSld>
+    <p:spTree>
+      <p:nvGrpSpPr>
+        <p:cNvPr id="1" name=""/>
+        <p:cNvGrpSpPr/>
+        <p:nvPr/>
+      </p:nvGrpSpPr>
+      <p:grpSpPr>
+        <a:xfrm>
+          <a:off x="0" y="0"/>
+          <a:ext cx="0" cy="0"/>
+          <a:chOff x="0" y="0"/>
+          <a:chExt cx="0" cy="0"/>
+        </a:xfrm>
+      </p:grpSpPr>
+      <p:sp>
+        <p:nvSpPr>
+          <p:cNvPr id="2" name="Tittel 1"/>
+          <p:cNvSpPr>
+            <a:spLocks noGrp="1"/>
+          </p:cNvSpPr>
+          <p:nvPr>
+            <p:ph type="ctrTitle"/>
+          </p:nvPr>
+        </p:nvSpPr>
+        <p:spPr/>
+        <p:txBody>
+          <a:bodyPr/>
+          <a:lstStyle/>
+          <a:p>
+            <a:r>
+              <a:rPr lang="nb-NO" dirty="0" err="1" smtClean="0"/>
+              <a:t>Hands-on</a:t>
+            </a:r>
+            <a:r>
+              <a:rPr lang="nb-NO" dirty="0" smtClean="0"/>
+              <a:t> </a:t>
+            </a:r>
+            <a:r>
+              <a:rPr lang="nb-NO" dirty="0" err="1" smtClean="0"/>
+              <a:t>session</a:t>
+            </a:r>
+            <a:endParaRPr lang="nb-NO" dirty="0"/>
+          </a:p>
+        </p:txBody>
+      </p:sp>
+      <p:sp>
+        <p:nvSpPr>
+          <p:cNvPr id="3" name="Undertittel 2"/>
+          <p:cNvSpPr>
+            <a:spLocks noGrp="1"/>
+          </p:cNvSpPr>
+          <p:nvPr>
+            <p:ph type="subTitle" idx="1"/>
+          </p:nvPr>
+        </p:nvSpPr>
+        <p:spPr/>
+        <p:txBody>
+          <a:bodyPr/>
+          <a:lstStyle/>
+          <a:p>
+            <a:endParaRPr lang="nb-NO" dirty="0"/>
+          </a:p>
+        </p:txBody>
+      </p:sp>
+    </p:spTree>
+    <p:extLst>
+      <p:ext uri="{BB962C8B-B14F-4D97-AF65-F5344CB8AC3E}">
+        <p14:creationId xmlns:p14="http://schemas.microsoft.com/office/powerpoint/2010/main" val="1641850311"/>
+      </p:ext>
+    </p:extLst>
+  </p:cSld>
+  <p:clrMapOvr>
+    <a:masterClrMapping/>
+  </p:clrMapOvr>
+  <p:timing>
+    <p:tnLst>
+      <p:par>
+        <p:cTn id="1" dur="indefinite" restart="never" nodeType="tmRoot"/>
+      </p:par>
+    </p:tnLst>
+  </p:timing>
+</p:sld>
+</file>
+
+<file path=ppt/slides/slide16.xml><?xml version="1.0" encoding="utf-8"?>
+<p:sld xmlns:a="http://schemas.openxmlformats.org/drawingml/2006/main" xmlns:r="http://schemas.openxmlformats.org/officeDocument/2006/relationships" xmlns:p="http://schemas.openxmlformats.org/presentationml/2006/main">
+  <p:cSld>
+    <p:spTree>
+      <p:nvGrpSpPr>
+        <p:cNvPr id="1" name=""/>
+        <p:cNvGrpSpPr/>
+        <p:nvPr/>
+      </p:nvGrpSpPr>
+      <p:grpSpPr>
+        <a:xfrm>
+          <a:off x="0" y="0"/>
+          <a:ext cx="0" cy="0"/>
+          <a:chOff x="0" y="0"/>
+          <a:chExt cx="0" cy="0"/>
+        </a:xfrm>
+      </p:grpSpPr>
+      <p:sp>
+        <p:nvSpPr>
+          <p:cNvPr id="5" name="Plassholder for innhold 4"/>
+          <p:cNvSpPr>
+            <a:spLocks noGrp="1"/>
+          </p:cNvSpPr>
+          <p:nvPr>
+            <p:ph idx="1"/>
+          </p:nvPr>
+        </p:nvSpPr>
+        <p:spPr/>
+        <p:txBody>
+          <a:bodyPr/>
+          <a:lstStyle/>
+          <a:p>
+            <a:r>
+              <a:rPr lang="nb-NO" dirty="0">
+                <a:hlinkClick r:id="rId2"/>
+              </a:rPr>
+              <a:t>https://</a:t>
+            </a:r>
+            <a:r>
+              <a:rPr lang="nb-NO" dirty="0" smtClean="0">
+                <a:hlinkClick r:id="rId2"/>
+              </a:rPr>
+              <a:t>github.com/bouvet/VisitorAndStrategyPattern</a:t>
+            </a:r>
+            <a:endParaRPr lang="nb-NO" dirty="0" smtClean="0"/>
+          </a:p>
+          <a:p>
+            <a:r>
+              <a:rPr lang="nb-NO" dirty="0" smtClean="0"/>
+              <a:t>C# og Java</a:t>
+            </a:r>
+            <a:endParaRPr lang="nb-NO" dirty="0"/>
+          </a:p>
+        </p:txBody>
+      </p:sp>
+      <p:sp>
+        <p:nvSpPr>
+          <p:cNvPr id="4" name="Tittel 3"/>
+          <p:cNvSpPr>
+            <a:spLocks noGrp="1"/>
+          </p:cNvSpPr>
+          <p:nvPr>
+            <p:ph type="title"/>
+          </p:nvPr>
+        </p:nvSpPr>
+        <p:spPr/>
+        <p:txBody>
+          <a:bodyPr/>
+          <a:lstStyle/>
+          <a:p>
+            <a:r>
+              <a:rPr lang="nb-NO" dirty="0" smtClean="0"/>
+              <a:t>Koden finner dere på </a:t>
+            </a:r>
+            <a:r>
+              <a:rPr lang="nb-NO" dirty="0" err="1" smtClean="0"/>
+              <a:t>GitHub</a:t>
+            </a:r>
+            <a:endParaRPr lang="nb-NO" dirty="0"/>
+          </a:p>
+        </p:txBody>
+      </p:sp>
+    </p:spTree>
+    <p:extLst>
+      <p:ext uri="{BB962C8B-B14F-4D97-AF65-F5344CB8AC3E}">
+        <p14:creationId xmlns:p14="http://schemas.microsoft.com/office/powerpoint/2010/main" val="3450875842"/>
+      </p:ext>
+    </p:extLst>
+  </p:cSld>
+  <p:clrMapOvr>
+    <a:masterClrMapping/>
+  </p:clrMapOvr>
+  <p:timing>
+    <p:tnLst>
+      <p:par>
+        <p:cTn id="1" dur="indefinite" restart="never" nodeType="tmRoot"/>
+      </p:par>
+    </p:tnLst>
+  </p:timing>
+</p:sld>
+</file>
+
+<file path=ppt/slides/slide17.xml><?xml version="1.0" encoding="utf-8"?>
+<p:sld xmlns:a="http://schemas.openxmlformats.org/drawingml/2006/main" xmlns:r="http://schemas.openxmlformats.org/officeDocument/2006/relationships" xmlns:p="http://schemas.openxmlformats.org/presentationml/2006/main">
+  <p:cSld>
+    <p:spTree>
+      <p:nvGrpSpPr>
+        <p:cNvPr id="1" name=""/>
+        <p:cNvGrpSpPr/>
+        <p:nvPr/>
+      </p:nvGrpSpPr>
+      <p:grpSpPr>
+        <a:xfrm>
+          <a:off x="0" y="0"/>
+          <a:ext cx="0" cy="0"/>
+          <a:chOff x="0" y="0"/>
+          <a:chExt cx="0" cy="0"/>
+        </a:xfrm>
+      </p:grpSpPr>
+      <p:sp>
+        <p:nvSpPr>
+          <p:cNvPr id="5" name="Plassholder for tekst 4"/>
+          <p:cNvSpPr>
+            <a:spLocks noGrp="1"/>
+          </p:cNvSpPr>
+          <p:nvPr>
+            <p:ph type="body" sz="quarter" idx="13"/>
+          </p:nvPr>
+        </p:nvSpPr>
+        <p:spPr/>
+        <p:txBody>
+          <a:bodyPr/>
+          <a:lstStyle/>
+          <a:p>
+            <a:r>
+              <a:rPr lang="nb-NO" sz="2000" dirty="0" smtClean="0"/>
+              <a:t>Bruk </a:t>
+            </a:r>
+            <a:r>
+              <a:rPr lang="nb-NO" sz="2000" dirty="0" err="1" smtClean="0"/>
+              <a:t>Strategy-pattern</a:t>
+            </a:r>
+            <a:r>
+              <a:rPr lang="nb-NO" sz="2000" dirty="0" smtClean="0"/>
+              <a:t> for å flytte ut rapport-logikken fra Company</a:t>
+            </a:r>
+            <a:endParaRPr lang="nb-NO" sz="2000" dirty="0"/>
+          </a:p>
+        </p:txBody>
+      </p:sp>
+      <p:sp>
+        <p:nvSpPr>
+          <p:cNvPr id="6" name="Plassholder for tekst 5"/>
+          <p:cNvSpPr>
+            <a:spLocks noGrp="1"/>
+          </p:cNvSpPr>
+          <p:nvPr>
+            <p:ph type="body" sz="quarter" idx="14"/>
+          </p:nvPr>
+        </p:nvSpPr>
+        <p:spPr/>
+        <p:txBody>
+          <a:bodyPr/>
+          <a:lstStyle/>
+          <a:p>
+            <a:r>
+              <a:rPr lang="nb-NO" sz="2000" dirty="0" smtClean="0"/>
+              <a:t>Bruk Visitor-</a:t>
+            </a:r>
+            <a:r>
+              <a:rPr lang="nb-NO" sz="2000" dirty="0" err="1" smtClean="0"/>
+              <a:t>pattern</a:t>
+            </a:r>
+            <a:r>
+              <a:rPr lang="nb-NO" sz="2000" dirty="0" smtClean="0"/>
+              <a:t> for å flytte ut kostnadsberegninger fra </a:t>
+            </a:r>
+            <a:r>
+              <a:rPr lang="nb-NO" sz="2000" dirty="0" err="1" smtClean="0"/>
+              <a:t>Employee</a:t>
+            </a:r>
+            <a:r>
+              <a:rPr lang="nb-NO" sz="2000" dirty="0" smtClean="0"/>
+              <a:t> og Consultant</a:t>
+            </a:r>
+            <a:endParaRPr lang="nb-NO" sz="2000" dirty="0"/>
+          </a:p>
+        </p:txBody>
+      </p:sp>
+      <p:sp>
+        <p:nvSpPr>
+          <p:cNvPr id="7" name="Plassholder for tekst 6"/>
+          <p:cNvSpPr>
+            <a:spLocks noGrp="1"/>
+          </p:cNvSpPr>
+          <p:nvPr>
+            <p:ph type="body" sz="quarter" idx="15"/>
+          </p:nvPr>
+        </p:nvSpPr>
+        <p:spPr/>
+        <p:txBody>
+          <a:bodyPr/>
+          <a:lstStyle/>
+          <a:p>
+            <a:r>
+              <a:rPr lang="nb-NO" sz="2000" dirty="0" smtClean="0"/>
+              <a:t>Kombiner Visitor med </a:t>
+            </a:r>
+            <a:r>
+              <a:rPr lang="nb-NO" sz="2000" dirty="0" err="1" smtClean="0"/>
+              <a:t>Strategy</a:t>
+            </a:r>
+            <a:r>
+              <a:rPr lang="nb-NO" sz="2000" dirty="0" smtClean="0"/>
+              <a:t> for å fjerne rapport-relatert kode fra </a:t>
+            </a:r>
+            <a:r>
+              <a:rPr lang="nb-NO" sz="2000" dirty="0" err="1" smtClean="0"/>
+              <a:t>Employee</a:t>
+            </a:r>
+            <a:r>
+              <a:rPr lang="nb-NO" sz="2000" dirty="0" smtClean="0"/>
+              <a:t> og Consultant</a:t>
+            </a:r>
+            <a:endParaRPr lang="nb-NO" sz="2000" dirty="0"/>
+          </a:p>
+        </p:txBody>
+      </p:sp>
+      <p:sp>
+        <p:nvSpPr>
+          <p:cNvPr id="4" name="Tittel 3"/>
+          <p:cNvSpPr>
+            <a:spLocks noGrp="1"/>
+          </p:cNvSpPr>
+          <p:nvPr>
+            <p:ph type="ctrTitle"/>
+          </p:nvPr>
+        </p:nvSpPr>
+        <p:spPr/>
+        <p:txBody>
+          <a:bodyPr/>
+          <a:lstStyle/>
+          <a:p>
+            <a:r>
+              <a:rPr lang="nb-NO" dirty="0" smtClean="0"/>
+              <a:t>Oppgaver</a:t>
+            </a:r>
+            <a:endParaRPr lang="nb-NO" dirty="0"/>
+          </a:p>
+        </p:txBody>
+      </p:sp>
+    </p:spTree>
+    <p:extLst>
+      <p:ext uri="{BB962C8B-B14F-4D97-AF65-F5344CB8AC3E}">
+        <p14:creationId xmlns:p14="http://schemas.microsoft.com/office/powerpoint/2010/main" val="4125141690"/>
+      </p:ext>
+    </p:extLst>
+  </p:cSld>
+  <p:clrMapOvr>
+    <a:masterClrMapping/>
+  </p:clrMapOvr>
+  <p:timing>
+    <p:tnLst>
+      <p:par>
+        <p:cTn id="1" dur="indefinite" restart="never" nodeType="tmRoot"/>
+      </p:par>
+    </p:tnLst>
+  </p:timing>
+</p:sld>
+</file>
+
+<file path=ppt/slides/slide2.xml><?xml version="1.0" encoding="utf-8"?>
+<p:sld xmlns:a="http://schemas.openxmlformats.org/drawingml/2006/main" xmlns:r="http://schemas.openxmlformats.org/officeDocument/2006/relationships" xmlns:p="http://schemas.openxmlformats.org/presentationml/2006/main">
+  <p:cSld>
+    <p:spTree>
+      <p:nvGrpSpPr>
+        <p:cNvPr id="1" name=""/>
+        <p:cNvGrpSpPr/>
+        <p:nvPr/>
+      </p:nvGrpSpPr>
+      <p:grpSpPr>
+        <a:xfrm>
+          <a:off x="0" y="0"/>
+          <a:ext cx="0" cy="0"/>
+          <a:chOff x="0" y="0"/>
+          <a:chExt cx="0" cy="0"/>
+        </a:xfrm>
+      </p:grpSpPr>
+      <p:sp>
+        <p:nvSpPr>
+          <p:cNvPr id="2" name="Tittel 1"/>
+          <p:cNvSpPr>
+            <a:spLocks noGrp="1"/>
+          </p:cNvSpPr>
+          <p:nvPr>
+            <p:ph type="ctrTitle"/>
+          </p:nvPr>
+        </p:nvSpPr>
+        <p:spPr/>
+        <p:txBody>
+          <a:bodyPr/>
+          <a:lstStyle/>
+          <a:p>
+            <a:r>
+              <a:rPr lang="nb-NO" dirty="0" smtClean="0"/>
+              <a:t>Innledning</a:t>
+            </a:r>
+            <a:endParaRPr lang="nb-NO" dirty="0"/>
+          </a:p>
+        </p:txBody>
+      </p:sp>
+      <p:sp>
+        <p:nvSpPr>
+          <p:cNvPr id="3" name="Undertittel 2"/>
+          <p:cNvSpPr>
+            <a:spLocks noGrp="1"/>
+          </p:cNvSpPr>
+          <p:nvPr>
+            <p:ph type="subTitle" idx="1"/>
+          </p:nvPr>
+        </p:nvSpPr>
+        <p:spPr/>
+        <p:txBody>
+          <a:bodyPr/>
+          <a:lstStyle/>
+          <a:p>
+            <a:r>
+              <a:rPr lang="nb-NO" dirty="0" smtClean="0"/>
+              <a:t>Øystein Jakobsen</a:t>
+            </a:r>
+            <a:endParaRPr lang="nb-NO" dirty="0"/>
+          </a:p>
+        </p:txBody>
+      </p:sp>
+    </p:spTree>
+    <p:extLst>
+      <p:ext uri="{BB962C8B-B14F-4D97-AF65-F5344CB8AC3E}">
+        <p14:creationId xmlns:p14="http://schemas.microsoft.com/office/powerpoint/2010/main" val="3698609642"/>
+      </p:ext>
+    </p:extLst>
+  </p:cSld>
+  <p:clrMapOvr>
+    <a:masterClrMapping/>
+  </p:clrMapOvr>
+  <p:timing>
+    <p:tnLst>
+      <p:par>
+        <p:cTn id="1" dur="indefinite" restart="never" nodeType="tmRoot"/>
+      </p:par>
+    </p:tnLst>
+  </p:timing>
+</p:sld>
+</file>
+
+<file path=ppt/slides/slide3.xml><?xml version="1.0" encoding="utf-8"?>
+<p:sld xmlns:a="http://schemas.openxmlformats.org/drawingml/2006/main" xmlns:r="http://schemas.openxmlformats.org/officeDocument/2006/relationships" xmlns:p="http://schemas.openxmlformats.org/presentationml/2006/main">
+  <p:cSld>
+    <p:spTree>
+      <p:nvGrpSpPr>
+        <p:cNvPr id="1" name=""/>
+        <p:cNvGrpSpPr/>
+        <p:nvPr/>
+      </p:nvGrpSpPr>
+      <p:grpSpPr>
+        <a:xfrm>
+          <a:off x="0" y="0"/>
+          <a:ext cx="0" cy="0"/>
+          <a:chOff x="0" y="0"/>
+          <a:chExt cx="0" cy="0"/>
+        </a:xfrm>
+      </p:grpSpPr>
+      <p:sp>
+        <p:nvSpPr>
+          <p:cNvPr id="8" name="Tittel 7"/>
+          <p:cNvSpPr>
+            <a:spLocks noGrp="1"/>
+          </p:cNvSpPr>
+          <p:nvPr>
+            <p:ph type="title"/>
+          </p:nvPr>
+        </p:nvSpPr>
+        <p:spPr/>
+        <p:txBody>
+          <a:bodyPr/>
+          <a:lstStyle/>
+          <a:p>
+            <a:r>
+              <a:rPr lang="nb-NO" dirty="0" smtClean="0"/>
+              <a:t>Hva og hvorfor</a:t>
+            </a:r>
+            <a:endParaRPr lang="nb-NO" dirty="0"/>
+          </a:p>
+        </p:txBody>
+      </p:sp>
+      <p:sp>
+        <p:nvSpPr>
+          <p:cNvPr id="9" name="Plassholder for innhold 8"/>
+          <p:cNvSpPr>
+            <a:spLocks noGrp="1"/>
+          </p:cNvSpPr>
+          <p:nvPr>
+            <p:ph idx="1"/>
+          </p:nvPr>
+        </p:nvSpPr>
+        <p:spPr/>
+        <p:txBody>
+          <a:bodyPr/>
+          <a:lstStyle/>
+          <a:p>
+            <a:r>
+              <a:rPr lang="nb-NO" dirty="0" smtClean="0"/>
+              <a:t>Standardløsninger på vanlige problemer</a:t>
+            </a:r>
+          </a:p>
+          <a:p>
+            <a:r>
+              <a:rPr lang="nb-NO" dirty="0" smtClean="0"/>
+              <a:t>Godt dokumenterte</a:t>
+            </a:r>
+          </a:p>
+          <a:p>
+            <a:r>
+              <a:rPr lang="nb-NO" dirty="0" smtClean="0"/>
+              <a:t>Godt forståtte</a:t>
+            </a:r>
+          </a:p>
+          <a:p>
+            <a:r>
+              <a:rPr lang="nb-NO" dirty="0" smtClean="0"/>
+              <a:t>Språknøytrale</a:t>
+            </a:r>
+          </a:p>
+        </p:txBody>
+      </p:sp>
+      <p:pic>
+        <p:nvPicPr>
+          <p:cNvPr id="1026" name="Picture 2" descr="https://images-na.ssl-images-amazon.com/images/I/81gtKoapHFL.jpg"/>
+          <p:cNvPicPr>
+            <a:picLocks noChangeAspect="1" noChangeArrowheads="1"/>
+          </p:cNvPicPr>
+          <p:nvPr/>
+        </p:nvPicPr>
+        <p:blipFill>
+          <a:blip r:embed="rId2" cstate="print">
+            <a:extLst>
+              <a:ext uri="{28A0092B-C50C-407E-A947-70E740481C1C}">
+                <a14:useLocalDpi xmlns:a14="http://schemas.microsoft.com/office/drawing/2010/main" val="0"/>
+              </a:ext>
+            </a:extLst>
+          </a:blip>
+          <a:srcRect/>
+          <a:stretch>
+            <a:fillRect/>
+          </a:stretch>
+        </p:blipFill>
+        <p:spPr bwMode="auto">
+          <a:xfrm>
+            <a:off x="6982029" y="365125"/>
+            <a:ext cx="4619402" cy="5811837"/>
+          </a:xfrm>
+          <a:prstGeom prst="rect">
+            <a:avLst/>
+          </a:prstGeom>
+          <a:noFill/>
+          <a:extLst>
+            <a:ext uri="{909E8E84-426E-40DD-AFC4-6F175D3DCCD1}">
+              <a14:hiddenFill xmlns:a14="http://schemas.microsoft.com/office/drawing/2010/main">
+                <a:solidFill>
+                  <a:srgbClr val="FFFFFF"/>
+                </a:solidFill>
+              </a14:hiddenFill>
+            </a:ext>
+          </a:extLst>
+        </p:spPr>
+      </p:pic>
+      <p:pic>
+        <p:nvPicPr>
+          <p:cNvPr id="1030" name="Picture 6" descr="https://images-na.ssl-images-amazon.com/images/I/51eqtvacK7L._SX376_BO1,204,203,200_.jpg"/>
+          <p:cNvPicPr>
+            <a:picLocks noChangeAspect="1" noChangeArrowheads="1"/>
+          </p:cNvPicPr>
+          <p:nvPr/>
+        </p:nvPicPr>
+        <p:blipFill>
+          <a:blip r:embed="rId3">
+            <a:extLst>
+              <a:ext uri="{28A0092B-C50C-407E-A947-70E740481C1C}">
+                <a14:useLocalDpi xmlns:a14="http://schemas.microsoft.com/office/drawing/2010/main" val="0"/>
+              </a:ext>
+            </a:extLst>
+          </a:blip>
+          <a:srcRect/>
+          <a:stretch>
+            <a:fillRect/>
+          </a:stretch>
+        </p:blipFill>
+        <p:spPr bwMode="auto">
+          <a:xfrm>
+            <a:off x="8615869" y="3233777"/>
+            <a:ext cx="2688986" cy="3549747"/>
+          </a:xfrm>
+          <a:prstGeom prst="rect">
+            <a:avLst/>
+          </a:prstGeom>
+          <a:noFill/>
+          <a:extLst>
+            <a:ext uri="{909E8E84-426E-40DD-AFC4-6F175D3DCCD1}">
+              <a14:hiddenFill xmlns:a14="http://schemas.microsoft.com/office/drawing/2010/main">
+                <a:solidFill>
+                  <a:srgbClr val="FFFFFF"/>
+                </a:solidFill>
+              </a14:hiddenFill>
+            </a:ext>
+          </a:extLst>
+        </p:spPr>
+      </p:pic>
+      <p:pic>
+        <p:nvPicPr>
+          <p:cNvPr id="1032" name="Picture 8" descr="https://www.martinfowler.com/books/eaa.jpg"/>
+          <p:cNvPicPr>
+            <a:picLocks noChangeAspect="1" noChangeArrowheads="1"/>
+          </p:cNvPicPr>
+          <p:nvPr/>
+        </p:nvPicPr>
+        <p:blipFill>
+          <a:blip r:embed="rId4">
+            <a:extLst>
+              <a:ext uri="{28A0092B-C50C-407E-A947-70E740481C1C}">
+                <a14:useLocalDpi xmlns:a14="http://schemas.microsoft.com/office/drawing/2010/main" val="0"/>
+              </a:ext>
+            </a:extLst>
+          </a:blip>
+          <a:srcRect/>
+          <a:stretch>
+            <a:fillRect/>
+          </a:stretch>
+        </p:blipFill>
+        <p:spPr bwMode="auto">
+          <a:xfrm>
+            <a:off x="5310676" y="2410239"/>
+            <a:ext cx="2826204" cy="3544060"/>
+          </a:xfrm>
+          <a:prstGeom prst="rect">
+            <a:avLst/>
+          </a:prstGeom>
+          <a:noFill/>
+          <a:extLst>
+            <a:ext uri="{909E8E84-426E-40DD-AFC4-6F175D3DCCD1}">
+              <a14:hiddenFill xmlns:a14="http://schemas.microsoft.com/office/drawing/2010/main">
+                <a:solidFill>
+                  <a:srgbClr val="FFFFFF"/>
+                </a:solidFill>
+              </a14:hiddenFill>
+            </a:ext>
+          </a:extLst>
+        </p:spPr>
+      </p:pic>
+    </p:spTree>
+    <p:extLst>
+      <p:ext uri="{BB962C8B-B14F-4D97-AF65-F5344CB8AC3E}">
+        <p14:creationId xmlns:p14="http://schemas.microsoft.com/office/powerpoint/2010/main" val="1013876649"/>
+      </p:ext>
+    </p:extLst>
+  </p:cSld>
+  <p:clrMapOvr>
+    <a:masterClrMapping/>
+  </p:clrMapOvr>
+  <p:timing>
+    <p:tnLst>
+      <p:par>
+        <p:cTn id="1" dur="indefinite" restart="never" nodeType="tmRoot">
+          <p:childTnLst>
+            <p:seq concurrent="1" nextAc="seek">
+              <p:cTn id="2" dur="indefinite" nodeType="mainSeq">
+                <p:childTnLst>
+                  <p:par>
+                    <p:cTn id="3" fill="hold">
+                      <p:stCondLst>
+                        <p:cond delay="indefinite"/>
+                      </p:stCondLst>
+                      <p:childTnLst>
+                        <p:par>
+                          <p:cTn id="4" fill="hold">
+                            <p:stCondLst>
+                              <p:cond delay="0"/>
+                            </p:stCondLst>
+                            <p:childTnLst>
+                              <p:par>
+                                <p:cTn id="5" presetID="2" presetClass="entr" presetSubtype="4" fill="hold" nodeType="clickEffect">
+                                  <p:stCondLst>
+                                    <p:cond delay="0"/>
+                                  </p:stCondLst>
+                                  <p:childTnLst>
+                                    <p:set>
+                                      <p:cBhvr>
+                                        <p:cTn id="6" dur="1" fill="hold">
+                                          <p:stCondLst>
+                                            <p:cond delay="0"/>
+                                          </p:stCondLst>
+                                        </p:cTn>
+                                        <p:tgtEl>
+                                          <p:spTgt spid="1032"/>
+                                        </p:tgtEl>
+                                        <p:attrNameLst>
+                                          <p:attrName>style.visibility</p:attrName>
+                                        </p:attrNameLst>
+                                      </p:cBhvr>
+                                      <p:to>
+                                        <p:strVal val="visible"/>
+                                      </p:to>
+                                    </p:set>
+                                    <p:anim calcmode="lin" valueType="num">
+                                      <p:cBhvr additive="base">
+                                        <p:cTn id="7" dur="500" fill="hold"/>
+                                        <p:tgtEl>
+                                          <p:spTgt spid="1032"/>
+                                        </p:tgtEl>
+                                        <p:attrNameLst>
+                                          <p:attrName>ppt_x</p:attrName>
+                                        </p:attrNameLst>
+                                      </p:cBhvr>
+                                      <p:tavLst>
+                                        <p:tav tm="0">
+                                          <p:val>
+                                            <p:strVal val="#ppt_x"/>
+                                          </p:val>
+                                        </p:tav>
+                                        <p:tav tm="100000">
+                                          <p:val>
+                                            <p:strVal val="#ppt_x"/>
+                                          </p:val>
+                                        </p:tav>
+                                      </p:tavLst>
+                                    </p:anim>
+                                    <p:anim calcmode="lin" valueType="num">
+                                      <p:cBhvr additive="base">
+                                        <p:cTn id="8" dur="500" fill="hold"/>
+                                        <p:tgtEl>
+                                          <p:spTgt spid="1032"/>
+                                        </p:tgtEl>
+                                        <p:attrNameLst>
+                                          <p:attrName>ppt_y</p:attrName>
+                                        </p:attrNameLst>
+                                      </p:cBhvr>
+                                      <p:tavLst>
+                                        <p:tav tm="0">
+                                          <p:val>
+                                            <p:strVal val="1+#ppt_h/2"/>
+                                          </p:val>
+                                        </p:tav>
+                                        <p:tav tm="100000">
+                                          <p:val>
+                                            <p:strVal val="#ppt_y"/>
+                                          </p:val>
+                                        </p:tav>
+                                      </p:tavLst>
+                                    </p:anim>
+                                  </p:childTnLst>
+                                </p:cTn>
+                              </p:par>
+                            </p:childTnLst>
+                          </p:cTn>
+                        </p:par>
+                      </p:childTnLst>
+                    </p:cTn>
+                  </p:par>
+                  <p:par>
+                    <p:cTn id="9" fill="hold">
+                      <p:stCondLst>
+                        <p:cond delay="indefinite"/>
+                      </p:stCondLst>
+                      <p:childTnLst>
+                        <p:par>
+                          <p:cTn id="10" fill="hold">
+                            <p:stCondLst>
+                              <p:cond delay="0"/>
+                            </p:stCondLst>
+                            <p:childTnLst>
+                              <p:par>
+                                <p:cTn id="11" presetID="2" presetClass="entr" presetSubtype="4" fill="hold" nodeType="clickEffect">
+                                  <p:stCondLst>
+                                    <p:cond delay="0"/>
+                                  </p:stCondLst>
+                                  <p:childTnLst>
+                                    <p:set>
+                                      <p:cBhvr>
+                                        <p:cTn id="12" dur="1" fill="hold">
+                                          <p:stCondLst>
+                                            <p:cond delay="0"/>
+                                          </p:stCondLst>
+                                        </p:cTn>
+                                        <p:tgtEl>
+                                          <p:spTgt spid="1030"/>
+                                        </p:tgtEl>
+                                        <p:attrNameLst>
+                                          <p:attrName>style.visibility</p:attrName>
+                                        </p:attrNameLst>
+                                      </p:cBhvr>
+                                      <p:to>
+                                        <p:strVal val="visible"/>
+                                      </p:to>
+                                    </p:set>
+                                    <p:anim calcmode="lin" valueType="num">
+                                      <p:cBhvr additive="base">
+                                        <p:cTn id="13" dur="500" fill="hold"/>
+                                        <p:tgtEl>
+                                          <p:spTgt spid="1030"/>
+                                        </p:tgtEl>
+                                        <p:attrNameLst>
+                                          <p:attrName>ppt_x</p:attrName>
+                                        </p:attrNameLst>
+                                      </p:cBhvr>
+                                      <p:tavLst>
+                                        <p:tav tm="0">
+                                          <p:val>
+                                            <p:strVal val="#ppt_x"/>
+                                          </p:val>
+                                        </p:tav>
+                                        <p:tav tm="100000">
+                                          <p:val>
+                                            <p:strVal val="#ppt_x"/>
+                                          </p:val>
+                                        </p:tav>
+                                      </p:tavLst>
+                                    </p:anim>
+                                    <p:anim calcmode="lin" valueType="num">
+                                      <p:cBhvr additive="base">
+                                        <p:cTn id="14" dur="500" fill="hold"/>
+                                        <p:tgtEl>
+                                          <p:spTgt spid="1030"/>
+                                        </p:tgtEl>
+                                        <p:attrNameLst>
+                                          <p:attrName>ppt_y</p:attrName>
+                                        </p:attrNameLst>
+                                      </p:cBhvr>
+                                      <p:tavLst>
+                                        <p:tav tm="0">
+                                          <p:val>
+                                            <p:strVal val="1+#ppt_h/2"/>
+                                          </p:val>
+                                        </p:tav>
+                                        <p:tav tm="100000">
+                                          <p:val>
+                                            <p:strVal val="#ppt_y"/>
+                                          </p:val>
+                                        </p:tav>
+                                      </p:tavLst>
+                                    </p:anim>
+                                  </p:childTnLst>
+                                </p:cTn>
+                              </p:par>
+                            </p:childTnLst>
+                          </p:cTn>
+                        </p:par>
+                      </p:childTnLst>
+                    </p:cTn>
+                  </p:par>
+                </p:childTnLst>
+              </p:cTn>
+              <p:prevCondLst>
+                <p:cond evt="onPrev" delay="0">
+                  <p:tgtEl>
+                    <p:sldTgt/>
+                  </p:tgtEl>
+                </p:cond>
+              </p:prevCondLst>
+              <p:nextCondLst>
+                <p:cond evt="onNext" delay="0">
+                  <p:tgtEl>
+                    <p:sldTgt/>
+                  </p:tgtEl>
+                </p:cond>
+              </p:nextCondLst>
+            </p:seq>
+          </p:childTnLst>
+        </p:cTn>
+      </p:par>
+    </p:tnLst>
+  </p:timing>
+</p:sld>
+</file>
+
+<file path=ppt/slides/slide4.xml><?xml version="1.0" encoding="utf-8"?>
+<p:sld xmlns:a="http://schemas.openxmlformats.org/drawingml/2006/main" xmlns:r="http://schemas.openxmlformats.org/officeDocument/2006/relationships" xmlns:p="http://schemas.openxmlformats.org/presentationml/2006/main">
+  <p:cSld>
+    <p:spTree>
+      <p:nvGrpSpPr>
+        <p:cNvPr id="1" name=""/>
+        <p:cNvGrpSpPr/>
+        <p:nvPr/>
+      </p:nvGrpSpPr>
+      <p:grpSpPr>
+        <a:xfrm>
+          <a:off x="0" y="0"/>
+          <a:ext cx="0" cy="0"/>
+          <a:chOff x="0" y="0"/>
+          <a:chExt cx="0" cy="0"/>
+        </a:xfrm>
+      </p:grpSpPr>
+      <p:sp>
+        <p:nvSpPr>
+          <p:cNvPr id="5" name="Tittel 4"/>
+          <p:cNvSpPr>
+            <a:spLocks noGrp="1"/>
+          </p:cNvSpPr>
+          <p:nvPr>
+            <p:ph type="title"/>
+          </p:nvPr>
+        </p:nvSpPr>
+        <p:spPr/>
+        <p:txBody>
+          <a:bodyPr/>
+          <a:lstStyle/>
+          <a:p>
+            <a:r>
+              <a:rPr lang="en-US" dirty="0"/>
+              <a:t>Gang of Four Design Patterns</a:t>
+            </a:r>
+            <a:endParaRPr lang="nb-NO" dirty="0"/>
+          </a:p>
+        </p:txBody>
+      </p:sp>
+      <p:sp>
+        <p:nvSpPr>
+          <p:cNvPr id="6" name="Plassholder for innhold 5"/>
+          <p:cNvSpPr>
+            <a:spLocks noGrp="1"/>
+          </p:cNvSpPr>
+          <p:nvPr>
+            <p:ph idx="1"/>
+          </p:nvPr>
+        </p:nvSpPr>
+        <p:spPr>
+          <a:xfrm>
+            <a:off x="1234800" y="1520687"/>
+            <a:ext cx="4861200" cy="5049078"/>
+          </a:xfrm>
+        </p:spPr>
+        <p:txBody>
+          <a:bodyPr/>
+          <a:lstStyle/>
+          <a:p>
+            <a:r>
+              <a:rPr lang="nb-NO" dirty="0" err="1" smtClean="0"/>
+              <a:t>Creational</a:t>
+            </a:r>
+            <a:r>
+              <a:rPr lang="nb-NO" dirty="0" smtClean="0"/>
+              <a:t> </a:t>
+            </a:r>
+            <a:r>
+              <a:rPr lang="nb-NO" dirty="0" err="1" smtClean="0"/>
+              <a:t>patterns</a:t>
+            </a:r>
+            <a:endParaRPr lang="nb-NO" dirty="0" smtClean="0"/>
+          </a:p>
+          <a:p>
+            <a:pPr lvl="2"/>
+            <a:r>
+              <a:rPr lang="nb-NO" dirty="0" err="1" smtClean="0"/>
+              <a:t>Abstract</a:t>
+            </a:r>
+            <a:r>
+              <a:rPr lang="nb-NO" dirty="0" smtClean="0"/>
+              <a:t> </a:t>
+            </a:r>
+            <a:r>
+              <a:rPr lang="nb-NO" dirty="0" err="1" smtClean="0"/>
+              <a:t>factory</a:t>
+            </a:r>
+            <a:endParaRPr lang="nb-NO" dirty="0" smtClean="0"/>
+          </a:p>
+          <a:p>
+            <a:pPr lvl="2"/>
+            <a:r>
+              <a:rPr lang="nb-NO" dirty="0" smtClean="0"/>
+              <a:t>Builder</a:t>
+            </a:r>
+          </a:p>
+          <a:p>
+            <a:pPr lvl="2"/>
+            <a:r>
+              <a:rPr lang="nb-NO" dirty="0" err="1" smtClean="0"/>
+              <a:t>Factory</a:t>
+            </a:r>
+            <a:r>
+              <a:rPr lang="nb-NO" dirty="0" smtClean="0"/>
+              <a:t> </a:t>
+            </a:r>
+            <a:r>
+              <a:rPr lang="nb-NO" dirty="0" err="1" smtClean="0"/>
+              <a:t>method</a:t>
+            </a:r>
+            <a:endParaRPr lang="nb-NO" dirty="0" smtClean="0"/>
+          </a:p>
+          <a:p>
+            <a:pPr lvl="2"/>
+            <a:r>
+              <a:rPr lang="nb-NO" dirty="0" smtClean="0"/>
+              <a:t>Prototype</a:t>
+            </a:r>
+          </a:p>
+          <a:p>
+            <a:pPr lvl="2"/>
+            <a:r>
+              <a:rPr lang="nb-NO" dirty="0" smtClean="0"/>
+              <a:t>Singleton</a:t>
+            </a:r>
+          </a:p>
+          <a:p>
+            <a:r>
+              <a:rPr lang="nb-NO" dirty="0" err="1" smtClean="0"/>
+              <a:t>Structural</a:t>
+            </a:r>
+            <a:r>
+              <a:rPr lang="nb-NO" dirty="0" smtClean="0"/>
+              <a:t> </a:t>
+            </a:r>
+            <a:r>
+              <a:rPr lang="nb-NO" dirty="0" err="1" smtClean="0"/>
+              <a:t>patterns</a:t>
+            </a:r>
+            <a:endParaRPr lang="nb-NO" dirty="0" smtClean="0"/>
+          </a:p>
+          <a:p>
+            <a:pPr lvl="2"/>
+            <a:r>
+              <a:rPr lang="nb-NO" dirty="0" smtClean="0"/>
+              <a:t>Adapter</a:t>
+            </a:r>
+          </a:p>
+          <a:p>
+            <a:pPr lvl="2"/>
+            <a:r>
+              <a:rPr lang="nb-NO" dirty="0" smtClean="0"/>
+              <a:t>Bridge</a:t>
+            </a:r>
+          </a:p>
+          <a:p>
+            <a:pPr lvl="2"/>
+            <a:r>
+              <a:rPr lang="nb-NO" dirty="0" err="1" smtClean="0"/>
+              <a:t>Composite</a:t>
+            </a:r>
+            <a:endParaRPr lang="nb-NO" dirty="0" smtClean="0"/>
+          </a:p>
+          <a:p>
+            <a:pPr lvl="2"/>
+            <a:r>
+              <a:rPr lang="nb-NO" dirty="0" err="1" smtClean="0"/>
+              <a:t>Decorator</a:t>
+            </a:r>
+            <a:endParaRPr lang="nb-NO" dirty="0" smtClean="0"/>
+          </a:p>
+          <a:p>
+            <a:pPr lvl="2"/>
+            <a:r>
+              <a:rPr lang="nb-NO" dirty="0" err="1" smtClean="0"/>
+              <a:t>Facade</a:t>
+            </a:r>
+            <a:endParaRPr lang="nb-NO" dirty="0" smtClean="0"/>
+          </a:p>
+          <a:p>
+            <a:pPr lvl="2"/>
+            <a:r>
+              <a:rPr lang="nb-NO" dirty="0" err="1" smtClean="0"/>
+              <a:t>Flyweight</a:t>
+            </a:r>
+            <a:endParaRPr lang="nb-NO" dirty="0" smtClean="0"/>
+          </a:p>
+          <a:p>
+            <a:pPr lvl="2"/>
+            <a:r>
+              <a:rPr lang="nb-NO" dirty="0" smtClean="0"/>
+              <a:t>Proxy</a:t>
+            </a:r>
+          </a:p>
+        </p:txBody>
+      </p:sp>
+      <p:sp>
+        <p:nvSpPr>
+          <p:cNvPr id="7" name="Plassholder for innhold 6"/>
+          <p:cNvSpPr>
+            <a:spLocks noGrp="1"/>
+          </p:cNvSpPr>
+          <p:nvPr>
+            <p:ph idx="13"/>
+          </p:nvPr>
+        </p:nvSpPr>
+        <p:spPr>
+          <a:xfrm>
+            <a:off x="6511650" y="1520687"/>
+            <a:ext cx="4869656" cy="5049078"/>
+          </a:xfrm>
+        </p:spPr>
+        <p:txBody>
+          <a:bodyPr/>
+          <a:lstStyle/>
+          <a:p>
+            <a:r>
+              <a:rPr lang="nb-NO" dirty="0" err="1" smtClean="0"/>
+              <a:t>Behavioural</a:t>
+            </a:r>
+            <a:r>
+              <a:rPr lang="nb-NO" dirty="0" smtClean="0"/>
+              <a:t> </a:t>
+            </a:r>
+            <a:r>
+              <a:rPr lang="nb-NO" dirty="0" err="1" smtClean="0"/>
+              <a:t>patterns</a:t>
+            </a:r>
+            <a:endParaRPr lang="nb-NO" dirty="0" smtClean="0"/>
+          </a:p>
+          <a:p>
+            <a:pPr lvl="2"/>
+            <a:r>
+              <a:rPr lang="nb-NO" dirty="0" smtClean="0"/>
+              <a:t>Chain </a:t>
+            </a:r>
+            <a:r>
+              <a:rPr lang="nb-NO" dirty="0" err="1" smtClean="0"/>
+              <a:t>of</a:t>
+            </a:r>
+            <a:r>
+              <a:rPr lang="nb-NO" dirty="0" smtClean="0"/>
+              <a:t> </a:t>
+            </a:r>
+            <a:r>
+              <a:rPr lang="nb-NO" dirty="0" err="1" smtClean="0"/>
+              <a:t>responsibility</a:t>
+            </a:r>
+            <a:endParaRPr lang="nb-NO" dirty="0" smtClean="0"/>
+          </a:p>
+          <a:p>
+            <a:pPr lvl="2"/>
+            <a:r>
+              <a:rPr lang="nb-NO" dirty="0" err="1" smtClean="0"/>
+              <a:t>Command</a:t>
+            </a:r>
+            <a:endParaRPr lang="nb-NO" dirty="0" smtClean="0"/>
+          </a:p>
+          <a:p>
+            <a:pPr lvl="2"/>
+            <a:r>
+              <a:rPr lang="nb-NO" dirty="0" smtClean="0"/>
+              <a:t>Interpreter</a:t>
+            </a:r>
+          </a:p>
+          <a:p>
+            <a:pPr lvl="2"/>
+            <a:r>
+              <a:rPr lang="nb-NO" dirty="0" err="1" smtClean="0"/>
+              <a:t>Iterator</a:t>
+            </a:r>
+            <a:endParaRPr lang="nb-NO" dirty="0" smtClean="0"/>
+          </a:p>
+          <a:p>
+            <a:pPr lvl="2"/>
+            <a:r>
+              <a:rPr lang="nb-NO" dirty="0" err="1" smtClean="0"/>
+              <a:t>Mediator</a:t>
+            </a:r>
+            <a:endParaRPr lang="nb-NO" dirty="0" smtClean="0"/>
+          </a:p>
+          <a:p>
+            <a:pPr lvl="2"/>
+            <a:r>
+              <a:rPr lang="nb-NO" dirty="0" smtClean="0"/>
+              <a:t>Memento</a:t>
+            </a:r>
+          </a:p>
+          <a:p>
+            <a:pPr lvl="2"/>
+            <a:r>
+              <a:rPr lang="nb-NO" dirty="0" smtClean="0"/>
+              <a:t>Observer</a:t>
+            </a:r>
+          </a:p>
+          <a:p>
+            <a:pPr lvl="2"/>
+            <a:r>
+              <a:rPr lang="nb-NO" dirty="0" smtClean="0"/>
+              <a:t>State</a:t>
+            </a:r>
+          </a:p>
+          <a:p>
+            <a:pPr lvl="2"/>
+            <a:r>
+              <a:rPr lang="nb-NO" b="1" dirty="0" err="1" smtClean="0"/>
+              <a:t>Strategy</a:t>
+            </a:r>
+            <a:endParaRPr lang="nb-NO" b="1" dirty="0" smtClean="0"/>
+          </a:p>
+          <a:p>
+            <a:pPr lvl="2"/>
+            <a:r>
+              <a:rPr lang="nb-NO" dirty="0" err="1" smtClean="0"/>
+              <a:t>Template</a:t>
+            </a:r>
+            <a:r>
+              <a:rPr lang="nb-NO" dirty="0" smtClean="0"/>
+              <a:t> </a:t>
+            </a:r>
+            <a:r>
+              <a:rPr lang="nb-NO" dirty="0" err="1" smtClean="0"/>
+              <a:t>method</a:t>
+            </a:r>
+            <a:endParaRPr lang="nb-NO" dirty="0" smtClean="0"/>
+          </a:p>
+          <a:p>
+            <a:pPr lvl="2"/>
+            <a:r>
+              <a:rPr lang="nb-NO" b="1" dirty="0" smtClean="0"/>
+              <a:t>Visitor</a:t>
+            </a:r>
+            <a:endParaRPr lang="nb-NO" b="1" dirty="0"/>
+          </a:p>
+        </p:txBody>
+      </p:sp>
+    </p:spTree>
+    <p:extLst>
+      <p:ext uri="{BB962C8B-B14F-4D97-AF65-F5344CB8AC3E}">
+        <p14:creationId xmlns:p14="http://schemas.microsoft.com/office/powerpoint/2010/main" val="4233883710"/>
+      </p:ext>
+    </p:extLst>
+  </p:cSld>
+  <p:clrMapOvr>
+    <a:masterClrMapping/>
+  </p:clrMapOvr>
+  <p:timing>
+    <p:tnLst>
+      <p:par>
+        <p:cTn id="1" dur="indefinite" restart="never" nodeType="tmRoot"/>
+      </p:par>
+    </p:tnLst>
+  </p:timing>
+</p:sld>
+</file>
+
+<file path=ppt/slides/slide5.xml><?xml version="1.0" encoding="utf-8"?>
+<p:sld xmlns:a="http://schemas.openxmlformats.org/drawingml/2006/main" xmlns:r="http://schemas.openxmlformats.org/officeDocument/2006/relationships" xmlns:p="http://schemas.openxmlformats.org/presentationml/2006/main">
+  <p:cSld>
+    <p:spTree>
+      <p:nvGrpSpPr>
+        <p:cNvPr id="1" name=""/>
+        <p:cNvGrpSpPr/>
+        <p:nvPr/>
+      </p:nvGrpSpPr>
+      <p:grpSpPr>
+        <a:xfrm>
+          <a:off x="0" y="0"/>
+          <a:ext cx="0" cy="0"/>
+          <a:chOff x="0" y="0"/>
+          <a:chExt cx="0" cy="0"/>
+        </a:xfrm>
+      </p:grpSpPr>
+      <p:sp>
+        <p:nvSpPr>
+          <p:cNvPr id="2" name="Tittel 1"/>
+          <p:cNvSpPr>
+            <a:spLocks noGrp="1"/>
+          </p:cNvSpPr>
+          <p:nvPr>
+            <p:ph type="title"/>
+          </p:nvPr>
+        </p:nvSpPr>
+        <p:spPr/>
+        <p:txBody>
+          <a:bodyPr/>
+          <a:lstStyle/>
+          <a:p>
+            <a:r>
+              <a:rPr lang="nb-NO" dirty="0" smtClean="0"/>
+              <a:t>Enterprise Integration </a:t>
+            </a:r>
+            <a:r>
+              <a:rPr lang="nb-NO" dirty="0" err="1" smtClean="0"/>
+              <a:t>Patterns</a:t>
+            </a:r>
+            <a:endParaRPr lang="nb-NO" dirty="0"/>
+          </a:p>
+        </p:txBody>
+      </p:sp>
+      <p:pic>
+        <p:nvPicPr>
+          <p:cNvPr id="2050" name="Picture 2" descr="https://assets.graffletopia.com/production/canvases/137/1973/1400528214/original.png?1400528214"/>
+          <p:cNvPicPr>
+            <a:picLocks noChangeAspect="1" noChangeArrowheads="1"/>
+          </p:cNvPicPr>
+          <p:nvPr/>
+        </p:nvPicPr>
+        <p:blipFill>
+          <a:blip r:embed="rId2">
+            <a:extLst>
+              <a:ext uri="{28A0092B-C50C-407E-A947-70E740481C1C}">
+                <a14:useLocalDpi xmlns:a14="http://schemas.microsoft.com/office/drawing/2010/main" val="0"/>
+              </a:ext>
+            </a:extLst>
+          </a:blip>
+          <a:srcRect/>
+          <a:stretch>
+            <a:fillRect/>
+          </a:stretch>
+        </p:blipFill>
+        <p:spPr bwMode="auto">
+          <a:xfrm>
+            <a:off x="3042893" y="1456082"/>
+            <a:ext cx="6858000" cy="5143501"/>
+          </a:xfrm>
+          <a:prstGeom prst="rect">
+            <a:avLst/>
+          </a:prstGeom>
+          <a:noFill/>
+          <a:extLst>
+            <a:ext uri="{909E8E84-426E-40DD-AFC4-6F175D3DCCD1}">
+              <a14:hiddenFill xmlns:a14="http://schemas.microsoft.com/office/drawing/2010/main">
+                <a:solidFill>
+                  <a:srgbClr val="FFFFFF"/>
+                </a:solidFill>
+              </a14:hiddenFill>
+            </a:ext>
+          </a:extLst>
+        </p:spPr>
+      </p:pic>
+    </p:spTree>
+    <p:extLst>
+      <p:ext uri="{BB962C8B-B14F-4D97-AF65-F5344CB8AC3E}">
+        <p14:creationId xmlns:p14="http://schemas.microsoft.com/office/powerpoint/2010/main" val="3013564781"/>
+      </p:ext>
+    </p:extLst>
+  </p:cSld>
+  <p:clrMapOvr>
+    <a:masterClrMapping/>
+  </p:clrMapOvr>
+  <p:timing>
+    <p:tnLst>
+      <p:par>
+        <p:cTn id="1" dur="indefinite" restart="never" nodeType="tmRoot"/>
+      </p:par>
+    </p:tnLst>
+  </p:timing>
+</p:sld>
+</file>
+
+<file path=ppt/slides/slide6.xml><?xml version="1.0" encoding="utf-8"?>
+<p:sld xmlns:a="http://schemas.openxmlformats.org/drawingml/2006/main" xmlns:r="http://schemas.openxmlformats.org/officeDocument/2006/relationships" xmlns:p="http://schemas.openxmlformats.org/presentationml/2006/main">
+  <p:cSld>
+    <p:spTree>
+      <p:nvGrpSpPr>
+        <p:cNvPr id="1" name=""/>
+        <p:cNvGrpSpPr/>
+        <p:nvPr/>
+      </p:nvGrpSpPr>
+      <p:grpSpPr>
+        <a:xfrm>
+          <a:off x="0" y="0"/>
+          <a:ext cx="0" cy="0"/>
+          <a:chOff x="0" y="0"/>
+          <a:chExt cx="0" cy="0"/>
+        </a:xfrm>
+      </p:grpSpPr>
+      <p:sp>
+        <p:nvSpPr>
+          <p:cNvPr id="2" name="Tittel 1"/>
+          <p:cNvSpPr>
+            <a:spLocks noGrp="1"/>
+          </p:cNvSpPr>
+          <p:nvPr>
+            <p:ph type="ctrTitle"/>
+          </p:nvPr>
+        </p:nvSpPr>
+        <p:spPr/>
+        <p:txBody>
+          <a:bodyPr/>
+          <a:lstStyle/>
+          <a:p>
+            <a:r>
+              <a:rPr lang="nb-NO" dirty="0" err="1" smtClean="0"/>
+              <a:t>Strategy</a:t>
+            </a:r>
+            <a:endParaRPr lang="nb-NO" dirty="0"/>
+          </a:p>
+        </p:txBody>
+      </p:sp>
+      <p:sp>
+        <p:nvSpPr>
+          <p:cNvPr id="3" name="Undertittel 2"/>
+          <p:cNvSpPr>
+            <a:spLocks noGrp="1"/>
+          </p:cNvSpPr>
+          <p:nvPr>
+            <p:ph type="subTitle" idx="1"/>
+          </p:nvPr>
+        </p:nvSpPr>
+        <p:spPr/>
+        <p:txBody>
+          <a:bodyPr/>
+          <a:lstStyle/>
+          <a:p>
+            <a:r>
+              <a:rPr lang="nb-NO" dirty="0" smtClean="0"/>
+              <a:t>Jon-Thomas Eliassen</a:t>
+            </a:r>
+            <a:endParaRPr lang="nb-NO" dirty="0"/>
+          </a:p>
+        </p:txBody>
+      </p:sp>
+    </p:spTree>
+    <p:extLst>
+      <p:ext uri="{BB962C8B-B14F-4D97-AF65-F5344CB8AC3E}">
+        <p14:creationId xmlns:p14="http://schemas.microsoft.com/office/powerpoint/2010/main" val="1611489258"/>
+      </p:ext>
+    </p:extLst>
+  </p:cSld>
+  <p:clrMapOvr>
+    <a:masterClrMapping/>
+  </p:clrMapOvr>
+  <p:timing>
+    <p:tnLst>
+      <p:par>
+        <p:cTn id="1" dur="indefinite" restart="never" nodeType="tmRoot"/>
+      </p:par>
+    </p:tnLst>
+  </p:timing>
+</p:sld>
+</file>
+
+<file path=ppt/slides/slide7.xml><?xml version="1.0" encoding="utf-8"?>
+<p:sld xmlns:a="http://schemas.openxmlformats.org/drawingml/2006/main" xmlns:r="http://schemas.openxmlformats.org/officeDocument/2006/relationships" xmlns:p="http://schemas.openxmlformats.org/presentationml/2006/main">
+  <p:cSld>
+    <p:spTree>
+      <p:nvGrpSpPr>
+        <p:cNvPr id="1" name=""/>
+        <p:cNvGrpSpPr/>
+        <p:nvPr/>
+      </p:nvGrpSpPr>
+      <p:grpSpPr>
+        <a:xfrm>
+          <a:off x="0" y="0"/>
+          <a:ext cx="0" cy="0"/>
+          <a:chOff x="0" y="0"/>
+          <a:chExt cx="0" cy="0"/>
+        </a:xfrm>
+      </p:grpSpPr>
+      <p:sp>
+        <p:nvSpPr>
+          <p:cNvPr id="9" name="Tittel 8"/>
+          <p:cNvSpPr>
+            <a:spLocks noGrp="1"/>
+          </p:cNvSpPr>
+          <p:nvPr>
+            <p:ph type="ctrTitle"/>
+          </p:nvPr>
+        </p:nvSpPr>
+        <p:spPr/>
+        <p:txBody>
+          <a:bodyPr/>
+          <a:lstStyle/>
+          <a:p>
+            <a:r>
+              <a:rPr lang="nb-NO" dirty="0" smtClean="0"/>
+              <a:t>Visitor</a:t>
+            </a:r>
+            <a:endParaRPr lang="nb-NO" dirty="0"/>
+          </a:p>
+        </p:txBody>
+      </p:sp>
+      <p:sp>
+        <p:nvSpPr>
+          <p:cNvPr id="10" name="Undertittel 9"/>
+          <p:cNvSpPr>
+            <a:spLocks noGrp="1"/>
+          </p:cNvSpPr>
+          <p:nvPr>
+            <p:ph type="subTitle" idx="1"/>
+          </p:nvPr>
+        </p:nvSpPr>
+        <p:spPr/>
+        <p:txBody>
+          <a:bodyPr/>
+          <a:lstStyle/>
+          <a:p>
+            <a:r>
+              <a:rPr lang="nb-NO" dirty="0" smtClean="0"/>
+              <a:t>Tor Erstad</a:t>
+            </a:r>
+            <a:endParaRPr lang="nb-NO" dirty="0"/>
+          </a:p>
+        </p:txBody>
+      </p:sp>
+    </p:spTree>
+    <p:extLst>
+      <p:ext uri="{BB962C8B-B14F-4D97-AF65-F5344CB8AC3E}">
+        <p14:creationId xmlns:p14="http://schemas.microsoft.com/office/powerpoint/2010/main" val="1745027018"/>
+      </p:ext>
+    </p:extLst>
+  </p:cSld>
+  <p:clrMapOvr>
+    <a:masterClrMapping/>
+  </p:clrMapOvr>
+  <p:timing>
+    <p:tnLst>
+      <p:par>
+        <p:cTn id="1" dur="indefinite" restart="never" nodeType="tmRoot"/>
+      </p:par>
+    </p:tnLst>
+  </p:timing>
+</p:sld>
+</file>
+
+<file path=ppt/slides/slide8.xml><?xml version="1.0" encoding="utf-8"?>
+<p:sld xmlns:a="http://schemas.openxmlformats.org/drawingml/2006/main" xmlns:r="http://schemas.openxmlformats.org/officeDocument/2006/relationships" xmlns:p="http://schemas.openxmlformats.org/presentationml/2006/main">
+  <p:cSld>
+    <p:spTree>
+      <p:nvGrpSpPr>
+        <p:cNvPr id="1" name=""/>
+        <p:cNvGrpSpPr/>
+        <p:nvPr/>
+      </p:nvGrpSpPr>
+      <p:grpSpPr>
+        <a:xfrm>
+          <a:off x="0" y="0"/>
+          <a:ext cx="0" cy="0"/>
+          <a:chOff x="0" y="0"/>
+          <a:chExt cx="0" cy="0"/>
+        </a:xfrm>
+      </p:grpSpPr>
+      <p:sp>
+        <p:nvSpPr>
+          <p:cNvPr id="2" name="Content Placeholder 1"/>
+          <p:cNvSpPr>
+            <a:spLocks noGrp="1"/>
+          </p:cNvSpPr>
+          <p:nvPr>
+            <p:ph idx="1"/>
+          </p:nvPr>
+        </p:nvSpPr>
+        <p:spPr/>
+        <p:txBody>
+          <a:bodyPr/>
+          <a:lstStyle/>
+          <a:p>
+            <a:r>
+              <a:rPr lang="nb-NO" dirty="0"/>
+              <a:t>Representerer en operasjon som skal utføres på alle objekter i en objekt-struktur</a:t>
+            </a:r>
+            <a:r>
+              <a:rPr lang="nb-NO" dirty="0" smtClean="0"/>
+              <a:t>.</a:t>
+            </a:r>
+          </a:p>
+          <a:p>
+            <a:r>
+              <a:rPr lang="nb-NO" dirty="0"/>
+              <a:t>Med Visitor kan man legge til nye operasjoner uten å endre på klassene i objekt-strukturen.</a:t>
+            </a:r>
+          </a:p>
+          <a:p>
+            <a:pPr marL="357187" lvl="1" indent="0">
+              <a:buNone/>
+            </a:pPr>
+            <a:endParaRPr lang="nb-NO" dirty="0"/>
+          </a:p>
+        </p:txBody>
+      </p:sp>
+      <p:sp>
+        <p:nvSpPr>
+          <p:cNvPr id="3" name="Title 2"/>
+          <p:cNvSpPr>
+            <a:spLocks noGrp="1"/>
+          </p:cNvSpPr>
+          <p:nvPr>
+            <p:ph type="title"/>
+          </p:nvPr>
+        </p:nvSpPr>
+        <p:spPr/>
+        <p:txBody>
+          <a:bodyPr/>
+          <a:lstStyle/>
+          <a:p>
+            <a:r>
+              <a:rPr lang="nb-NO" dirty="0" smtClean="0"/>
+              <a:t>Visitor - hensikt</a:t>
+            </a:r>
+            <a:endParaRPr lang="nb-NO" dirty="0"/>
+          </a:p>
+        </p:txBody>
+      </p:sp>
+    </p:spTree>
+    <p:extLst>
+      <p:ext uri="{BB962C8B-B14F-4D97-AF65-F5344CB8AC3E}">
+        <p14:creationId xmlns:p14="http://schemas.microsoft.com/office/powerpoint/2010/main" val="2302386445"/>
+      </p:ext>
+    </p:extLst>
+  </p:cSld>
+  <p:clrMapOvr>
+    <a:masterClrMapping/>
+  </p:clrMapOvr>
+  <p:timing>
+    <p:tnLst>
+      <p:par>
+        <p:cTn id="1" dur="indefinite" restart="never" nodeType="tmRoot">
+          <p:childTnLst>
+            <p:seq concurrent="1" nextAc="seek">
+              <p:cTn id="2" dur="indefinite" nodeType="mainSeq">
+                <p:childTnLst>
+                  <p:par>
+                    <p:cTn id="3" fill="hold">
+                      <p:stCondLst>
+                        <p:cond delay="indefinite"/>
+                      </p:stCondLst>
+                      <p:childTnLst>
+                        <p:par>
+                          <p:cTn id="4" fill="hold">
+                            <p:stCondLst>
+                              <p:cond delay="0"/>
+                            </p:stCondLst>
+                            <p:childTnLst>
+                              <p:par>
+                                <p:cTn id="5" presetID="1" presetClass="entr" presetSubtype="0" fill="hold" grpId="0" nodeType="clickEffect">
+                                  <p:stCondLst>
+                                    <p:cond delay="0"/>
+                                  </p:stCondLst>
+                                  <p:childTnLst>
+                                    <p:set>
+                                      <p:cBhvr>
+                                        <p:cTn id="6" dur="1" fill="hold">
+                                          <p:stCondLst>
+                                            <p:cond delay="0"/>
+                                          </p:stCondLst>
+                                        </p:cTn>
+                                        <p:tgtEl>
+                                          <p:spTgt spid="2">
+                                            <p:txEl>
+                                              <p:pRg st="0" end="0"/>
+                                            </p:txEl>
+                                          </p:spTgt>
+                                        </p:tgtEl>
+                                        <p:attrNameLst>
+                                          <p:attrName>style.visibility</p:attrName>
+                                        </p:attrNameLst>
+                                      </p:cBhvr>
+                                      <p:to>
+                                        <p:strVal val="visible"/>
+                                      </p:to>
+                                    </p:set>
+                                  </p:childTnLst>
+                                </p:cTn>
+                              </p:par>
+                            </p:childTnLst>
+                          </p:cTn>
+                        </p:par>
+                      </p:childTnLst>
+                    </p:cTn>
+                  </p:par>
+                  <p:par>
+                    <p:cTn id="7" fill="hold">
+                      <p:stCondLst>
+                        <p:cond delay="indefinite"/>
+                      </p:stCondLst>
+                      <p:childTnLst>
+                        <p:par>
+                          <p:cTn id="8" fill="hold">
+                            <p:stCondLst>
+                              <p:cond delay="0"/>
+                            </p:stCondLst>
+                            <p:childTnLst>
+                              <p:par>
+                                <p:cTn id="9" presetID="1" presetClass="entr" presetSubtype="0" fill="hold" grpId="0" nodeType="clickEffect">
+                                  <p:stCondLst>
+                                    <p:cond delay="0"/>
+                                  </p:stCondLst>
+                                  <p:childTnLst>
+                                    <p:set>
+                                      <p:cBhvr>
+                                        <p:cTn id="10" dur="1" fill="hold">
+                                          <p:stCondLst>
+                                            <p:cond delay="0"/>
+                                          </p:stCondLst>
+                                        </p:cTn>
+                                        <p:tgtEl>
+                                          <p:spTgt spid="2">
+                                            <p:txEl>
+                                              <p:pRg st="1" end="1"/>
+                                            </p:txEl>
+                                          </p:spTgt>
+                                        </p:tgtEl>
+                                        <p:attrNameLst>
+                                          <p:attrName>style.visibility</p:attrName>
+                                        </p:attrNameLst>
+                                      </p:cBhvr>
+                                      <p:to>
+                                        <p:strVal val="visible"/>
+                                      </p:to>
+                                    </p:set>
+                                  </p:childTnLst>
+                                </p:cTn>
+                              </p:par>
+                            </p:childTnLst>
+                          </p:cTn>
+                        </p:par>
+                      </p:childTnLst>
+                    </p:cTn>
+                  </p:par>
+                </p:childTnLst>
+              </p:cTn>
+              <p:prevCondLst>
+                <p:cond evt="onPrev" delay="0">
+                  <p:tgtEl>
+                    <p:sldTgt/>
+                  </p:tgtEl>
+                </p:cond>
+              </p:prevCondLst>
+              <p:nextCondLst>
+                <p:cond evt="onNext" delay="0">
+                  <p:tgtEl>
+                    <p:sldTgt/>
+                  </p:tgtEl>
+                </p:cond>
+              </p:nextCondLst>
+            </p:seq>
+          </p:childTnLst>
+        </p:cTn>
+      </p:par>
+    </p:tnLst>
+    <p:bldLst>
+      <p:bldP spid="2" grpId="0" uiExpand="1" build="p"/>
+    </p:bldLst>
+  </p:timing>
+</p:sld>
+</file>
+
+<file path=ppt/slides/slide9.xml><?xml version="1.0" encoding="utf-8"?>
+<p:sld xmlns:a="http://schemas.openxmlformats.org/drawingml/2006/main" xmlns:r="http://schemas.openxmlformats.org/officeDocument/2006/relationships" xmlns:p="http://schemas.openxmlformats.org/presentationml/2006/main">
+  <p:cSld>
+    <p:spTree>
+      <p:nvGrpSpPr>
+        <p:cNvPr id="1" name=""/>
+        <p:cNvGrpSpPr/>
+        <p:nvPr/>
+      </p:nvGrpSpPr>
+      <p:grpSpPr>
+        <a:xfrm>
+          <a:off x="0" y="0"/>
+          <a:ext cx="0" cy="0"/>
+          <a:chOff x="0" y="0"/>
+          <a:chExt cx="0" cy="0"/>
+        </a:xfrm>
+      </p:grpSpPr>
+      <p:sp>
+        <p:nvSpPr>
+          <p:cNvPr id="2" name="Content Placeholder 1"/>
+          <p:cNvSpPr>
+            <a:spLocks noGrp="1"/>
+          </p:cNvSpPr>
+          <p:nvPr>
+            <p:ph idx="1"/>
+          </p:nvPr>
+        </p:nvSpPr>
+        <p:spPr/>
+        <p:txBody>
+          <a:bodyPr/>
+          <a:lstStyle/>
+          <a:p>
+            <a:r>
+              <a:rPr lang="nb-NO" dirty="0"/>
+              <a:t>Man har en objekt-struktur som består av ulike typer (klasser), og man ønsker å traversere gjennom elementene for å utføre en operasjon som er implementert ulikt for de ulike typene.</a:t>
+            </a:r>
+          </a:p>
+          <a:p>
+            <a:r>
+              <a:rPr lang="nb-NO" dirty="0"/>
+              <a:t>En måte å løse problemet på er ved å bruke arv, hvor hver sub-type implementerer sin variant av operasjonen.</a:t>
+            </a:r>
+          </a:p>
+          <a:p>
+            <a:pPr lvl="1"/>
+            <a:r>
+              <a:rPr lang="nb-NO" dirty="0"/>
+              <a:t>Dette kan medføre brudd på Single-</a:t>
+            </a:r>
+            <a:r>
+              <a:rPr lang="nb-NO" dirty="0" err="1"/>
+              <a:t>responsibility</a:t>
+            </a:r>
+            <a:r>
+              <a:rPr lang="nb-NO" dirty="0"/>
+              <a:t> prinsippet da operasjonen ikke nødvendigvis hører hjemme i klassen, og bare er aktuell </a:t>
+            </a:r>
+            <a:r>
+              <a:rPr lang="nb-NO" dirty="0" err="1"/>
+              <a:t>ifm</a:t>
+            </a:r>
+            <a:r>
+              <a:rPr lang="nb-NO" dirty="0"/>
+              <a:t> traverseringen.</a:t>
+            </a:r>
+          </a:p>
+          <a:p>
+            <a:pPr lvl="1"/>
+            <a:r>
+              <a:rPr lang="nb-NO" dirty="0"/>
+              <a:t>Dersom det blir behov for en ny type operasjon, må alle klassene implementere denne, som er et brudd på Open/</a:t>
+            </a:r>
+            <a:r>
+              <a:rPr lang="nb-NO" dirty="0" err="1"/>
+              <a:t>Closed</a:t>
+            </a:r>
+            <a:r>
+              <a:rPr lang="nb-NO" dirty="0"/>
+              <a:t> prinsippet.</a:t>
+            </a:r>
+          </a:p>
+          <a:p>
+            <a:pPr marL="0" indent="0">
+              <a:buNone/>
+            </a:pPr>
+            <a:endParaRPr lang="nb-NO" dirty="0"/>
+          </a:p>
+        </p:txBody>
+      </p:sp>
+      <p:sp>
+        <p:nvSpPr>
+          <p:cNvPr id="3" name="Title 2"/>
+          <p:cNvSpPr>
+            <a:spLocks noGrp="1"/>
+          </p:cNvSpPr>
+          <p:nvPr>
+            <p:ph type="title"/>
+          </p:nvPr>
+        </p:nvSpPr>
+        <p:spPr/>
+        <p:txBody>
+          <a:bodyPr/>
+          <a:lstStyle/>
+          <a:p>
+            <a:r>
+              <a:rPr lang="nb-NO" dirty="0" smtClean="0"/>
+              <a:t>Visitor - bakgrunn</a:t>
+            </a:r>
+            <a:endParaRPr lang="nb-NO" dirty="0"/>
+          </a:p>
+        </p:txBody>
+      </p:sp>
+    </p:spTree>
+    <p:extLst>
+      <p:ext uri="{BB962C8B-B14F-4D97-AF65-F5344CB8AC3E}">
+        <p14:creationId xmlns:p14="http://schemas.microsoft.com/office/powerpoint/2010/main" val="697017918"/>
       </p:ext>
     </p:extLst>
   </p:cSld>
@@ -16612,6 +18614,61 @@
 </file>
 
 <file path=customXml/item1.xml><?xml version="1.0" encoding="utf-8"?>
+<?mso-contentType ?>
+<FormTemplates xmlns="http://schemas.microsoft.com/sharepoint/v3/contenttype/forms">
+  <Display>DocumentLibraryForm</Display>
+  <Edit>DocumentLibraryForm</Edit>
+  <New>DocumentLibraryForm</New>
+</FormTemplates>
+</file>
+
+<file path=customXml/item2.xml><?xml version="1.0" encoding="utf-8"?>
+<?mso-contentType ?>
+<spe:Receivers xmlns:spe="http://schemas.microsoft.com/sharepoint/events">
+  <Receiver>
+    <Name>Document ID Generator</Name>
+    <Synchronization>Synchronous</Synchronization>
+    <Type>10001</Type>
+    <SequenceNumber>1000</SequenceNumber>
+    <Assembly>Microsoft.Office.DocumentManagement, Version=14.0.0.0, Culture=neutral, PublicKeyToken=71e9bce111e9429c</Assembly>
+    <Class>Microsoft.Office.DocumentManagement.Internal.DocIdHandler</Class>
+    <Data/>
+    <Filter/>
+  </Receiver>
+  <Receiver>
+    <Name>Document ID Generator</Name>
+    <Synchronization>Synchronous</Synchronization>
+    <Type>10002</Type>
+    <SequenceNumber>1001</SequenceNumber>
+    <Assembly>Microsoft.Office.DocumentManagement, Version=14.0.0.0, Culture=neutral, PublicKeyToken=71e9bce111e9429c</Assembly>
+    <Class>Microsoft.Office.DocumentManagement.Internal.DocIdHandler</Class>
+    <Data/>
+    <Filter/>
+  </Receiver>
+  <Receiver>
+    <Name>Document ID Generator</Name>
+    <Synchronization>Synchronous</Synchronization>
+    <Type>10004</Type>
+    <SequenceNumber>1002</SequenceNumber>
+    <Assembly>Microsoft.Office.DocumentManagement, Version=14.0.0.0, Culture=neutral, PublicKeyToken=71e9bce111e9429c</Assembly>
+    <Class>Microsoft.Office.DocumentManagement.Internal.DocIdHandler</Class>
+    <Data/>
+    <Filter/>
+  </Receiver>
+  <Receiver>
+    <Name>Document ID Generator</Name>
+    <Synchronization>Synchronous</Synchronization>
+    <Type>10006</Type>
+    <SequenceNumber>1003</SequenceNumber>
+    <Assembly>Microsoft.Office.DocumentManagement, Version=14.0.0.0, Culture=neutral, PublicKeyToken=71e9bce111e9429c</Assembly>
+    <Class>Microsoft.Office.DocumentManagement.Internal.DocIdHandler</Class>
+    <Data/>
+    <Filter/>
+  </Receiver>
+</spe:Receivers>
+</file>
+
+<file path=customXml/item3.xml><?xml version="1.0" encoding="utf-8"?>
 <ct:contentTypeSchema xmlns:ct="http://schemas.microsoft.com/office/2006/metadata/contentType" xmlns:ma="http://schemas.microsoft.com/office/2006/metadata/properties/metaAttributes" ct:_="" ma:_="" ma:contentTypeName="Document" ma:contentTypeID="0x0101006DE77A4C69F7B04F983EB828CF8C5433" ma:contentTypeVersion="2" ma:contentTypeDescription="Create a new document." ma:contentTypeScope="" ma:versionID="3f88a36eb5d68a1319bea6a26a0634f9">
   <xsd:schema xmlns:xsd="http://www.w3.org/2001/XMLSchema" xmlns:xs="http://www.w3.org/2001/XMLSchema" xmlns:p="http://schemas.microsoft.com/office/2006/metadata/properties" xmlns:ns1="http://schemas.microsoft.com/sharepoint/v3" xmlns:ns2="cd7095a3-97f1-4663-a71f-a762e9d8a5de" targetNamespace="http://schemas.microsoft.com/office/2006/metadata/properties" ma:root="true" ma:fieldsID="12e73613dd42fd77c3af4275080e49b8" ns1:_="" ns2:_="">
     <xsd:import namespace="http://schemas.microsoft.com/sharepoint/v3"/>
@@ -16773,61 +18830,6 @@
 </ct:contentTypeSchema>
 </file>
 
-<file path=customXml/item2.xml><?xml version="1.0" encoding="utf-8"?>
-<?mso-contentType ?>
-<spe:Receivers xmlns:spe="http://schemas.microsoft.com/sharepoint/events">
-  <Receiver>
-    <Name>Document ID Generator</Name>
-    <Synchronization>Synchronous</Synchronization>
-    <Type>10001</Type>
-    <SequenceNumber>1000</SequenceNumber>
-    <Assembly>Microsoft.Office.DocumentManagement, Version=14.0.0.0, Culture=neutral, PublicKeyToken=71e9bce111e9429c</Assembly>
-    <Class>Microsoft.Office.DocumentManagement.Internal.DocIdHandler</Class>
-    <Data/>
-    <Filter/>
-  </Receiver>
-  <Receiver>
-    <Name>Document ID Generator</Name>
-    <Synchronization>Synchronous</Synchronization>
-    <Type>10002</Type>
-    <SequenceNumber>1001</SequenceNumber>
-    <Assembly>Microsoft.Office.DocumentManagement, Version=14.0.0.0, Culture=neutral, PublicKeyToken=71e9bce111e9429c</Assembly>
-    <Class>Microsoft.Office.DocumentManagement.Internal.DocIdHandler</Class>
-    <Data/>
-    <Filter/>
-  </Receiver>
-  <Receiver>
-    <Name>Document ID Generator</Name>
-    <Synchronization>Synchronous</Synchronization>
-    <Type>10004</Type>
-    <SequenceNumber>1002</SequenceNumber>
-    <Assembly>Microsoft.Office.DocumentManagement, Version=14.0.0.0, Culture=neutral, PublicKeyToken=71e9bce111e9429c</Assembly>
-    <Class>Microsoft.Office.DocumentManagement.Internal.DocIdHandler</Class>
-    <Data/>
-    <Filter/>
-  </Receiver>
-  <Receiver>
-    <Name>Document ID Generator</Name>
-    <Synchronization>Synchronous</Synchronization>
-    <Type>10006</Type>
-    <SequenceNumber>1003</SequenceNumber>
-    <Assembly>Microsoft.Office.DocumentManagement, Version=14.0.0.0, Culture=neutral, PublicKeyToken=71e9bce111e9429c</Assembly>
-    <Class>Microsoft.Office.DocumentManagement.Internal.DocIdHandler</Class>
-    <Data/>
-    <Filter/>
-  </Receiver>
-</spe:Receivers>
-</file>
-
-<file path=customXml/item3.xml><?xml version="1.0" encoding="utf-8"?>
-<?mso-contentType ?>
-<FormTemplates xmlns="http://schemas.microsoft.com/sharepoint/v3/contenttype/forms">
-  <Display>DocumentLibraryForm</Display>
-  <Edit>DocumentLibraryForm</Edit>
-  <New>DocumentLibraryForm</New>
-</FormTemplates>
-</file>
-
 <file path=customXml/item4.xml><?xml version="1.0" encoding="utf-8"?>
 <p:properties xmlns:p="http://schemas.microsoft.com/office/2006/metadata/properties" xmlns:xsi="http://www.w3.org/2001/XMLSchema-instance" xmlns:pc="http://schemas.microsoft.com/office/infopath/2007/PartnerControls">
   <documentManagement>
@@ -16843,6 +18845,22 @@
 </file>
 
 <file path=customXml/itemProps1.xml><?xml version="1.0" encoding="utf-8"?>
+<ds:datastoreItem xmlns:ds="http://schemas.openxmlformats.org/officeDocument/2006/customXml" ds:itemID="{BB82CC63-55FC-4D22-9ED3-DB88AF6228E1}">
+  <ds:schemaRefs>
+    <ds:schemaRef ds:uri="http://schemas.microsoft.com/sharepoint/v3/contenttype/forms"/>
+  </ds:schemaRefs>
+</ds:datastoreItem>
+</file>
+
+<file path=customXml/itemProps2.xml><?xml version="1.0" encoding="utf-8"?>
+<ds:datastoreItem xmlns:ds="http://schemas.openxmlformats.org/officeDocument/2006/customXml" ds:itemID="{1B3F50AB-02FD-4C47-98D2-8857298FC473}">
+  <ds:schemaRefs>
+    <ds:schemaRef ds:uri="http://schemas.microsoft.com/sharepoint/events"/>
+  </ds:schemaRefs>
+</ds:datastoreItem>
+</file>
+
+<file path=customXml/itemProps3.xml><?xml version="1.0" encoding="utf-8"?>
 <ds:datastoreItem xmlns:ds="http://schemas.openxmlformats.org/officeDocument/2006/customXml" ds:itemID="{1F8D2ADD-9475-4053-913E-BB32E431EB0D}">
   <ds:schemaRefs>
     <ds:schemaRef ds:uri="http://schemas.microsoft.com/office/2006/metadata/contentType"/>
@@ -16857,22 +18875,6 @@
     <ds:schemaRef ds:uri="http://purl.org/dc/elements/1.1/"/>
     <ds:schemaRef ds:uri="http://purl.org/dc/terms/"/>
     <ds:schemaRef ds:uri="http://schemas.microsoft.com/internal/obd"/>
-  </ds:schemaRefs>
-</ds:datastoreItem>
-</file>
-
-<file path=customXml/itemProps2.xml><?xml version="1.0" encoding="utf-8"?>
-<ds:datastoreItem xmlns:ds="http://schemas.openxmlformats.org/officeDocument/2006/customXml" ds:itemID="{1B3F50AB-02FD-4C47-98D2-8857298FC473}">
-  <ds:schemaRefs>
-    <ds:schemaRef ds:uri="http://schemas.microsoft.com/sharepoint/events"/>
-  </ds:schemaRefs>
-</ds:datastoreItem>
-</file>
-
-<file path=customXml/itemProps3.xml><?xml version="1.0" encoding="utf-8"?>
-<ds:datastoreItem xmlns:ds="http://schemas.openxmlformats.org/officeDocument/2006/customXml" ds:itemID="{BB82CC63-55FC-4D22-9ED3-DB88AF6228E1}">
-  <ds:schemaRefs>
-    <ds:schemaRef ds:uri="http://schemas.microsoft.com/sharepoint/v3/contenttype/forms"/>
   </ds:schemaRefs>
 </ds:datastoreItem>
 </file>

</xml_diff>

<commit_message>
Noen endringer i Visitor-delen av presentasjonen
</commit_message>
<xml_diff>
--- a/Presentasjon.pptx
+++ b/Presentasjon.pptx
@@ -7,10 +7,10 @@
     <p:sldMasterId id="2147483705" r:id="rId7"/>
   </p:sldMasterIdLst>
   <p:notesMasterIdLst>
-    <p:notesMasterId r:id="rId34"/>
+    <p:notesMasterId r:id="rId37"/>
   </p:notesMasterIdLst>
   <p:handoutMasterIdLst>
-    <p:handoutMasterId r:id="rId35"/>
+    <p:handoutMasterId r:id="rId38"/>
   </p:handoutMasterIdLst>
   <p:sldIdLst>
     <p:sldId id="263" r:id="rId8"/>
@@ -32,13 +32,16 @@
     <p:sldId id="256" r:id="rId24"/>
     <p:sldId id="257" r:id="rId25"/>
     <p:sldId id="258" r:id="rId26"/>
-    <p:sldId id="259" r:id="rId27"/>
-    <p:sldId id="260" r:id="rId28"/>
-    <p:sldId id="261" r:id="rId29"/>
-    <p:sldId id="262" r:id="rId30"/>
-    <p:sldId id="270" r:id="rId31"/>
-    <p:sldId id="272" r:id="rId32"/>
-    <p:sldId id="271" r:id="rId33"/>
+    <p:sldId id="282" r:id="rId27"/>
+    <p:sldId id="283" r:id="rId28"/>
+    <p:sldId id="284" r:id="rId29"/>
+    <p:sldId id="259" r:id="rId30"/>
+    <p:sldId id="260" r:id="rId31"/>
+    <p:sldId id="261" r:id="rId32"/>
+    <p:sldId id="262" r:id="rId33"/>
+    <p:sldId id="270" r:id="rId34"/>
+    <p:sldId id="272" r:id="rId35"/>
+    <p:sldId id="271" r:id="rId36"/>
   </p:sldIdLst>
   <p:sldSz cx="12192000" cy="6858000"/>
   <p:notesSz cx="6858000" cy="9144000"/>
@@ -245,7 +248,7 @@
           <a:p>
             <a:fld id="{54C52192-B826-4AE0-9CD6-BEA9467D12B3}" type="datetimeFigureOut">
               <a:rPr lang="nb-NO" smtClean="0"/>
-              <a:t>29.10.2017</a:t>
+              <a:t>30.10.2017</a:t>
             </a:fld>
             <a:endParaRPr lang="nb-NO"/>
           </a:p>
@@ -410,7 +413,7 @@
           <a:p>
             <a:fld id="{2696BCB2-2760-41B1-A1BE-7886EF110FCB}" type="datetimeFigureOut">
               <a:rPr lang="nb-NO" smtClean="0"/>
-              <a:t>29.10.2017</a:t>
+              <a:t>30.10.2017</a:t>
             </a:fld>
             <a:endParaRPr lang="nb-NO"/>
           </a:p>
@@ -10530,6 +10533,13 @@
   <p:clrMapOvr>
     <a:masterClrMapping/>
   </p:clrMapOvr>
+  <p:timing>
+    <p:tnLst>
+      <p:par>
+        <p:cTn id="1" dur="indefinite" restart="never" nodeType="tmRoot"/>
+      </p:par>
+    </p:tnLst>
+  </p:timing>
 </p:sld>
 </file>
 
@@ -10586,7 +10596,7 @@
           <p:cNvPr id="2" name="Bilde 1">
             <a:extLst>
               <a:ext uri="{FF2B5EF4-FFF2-40B4-BE49-F238E27FC236}">
-                <a16:creationId xmlns:a16="http://schemas.microsoft.com/office/drawing/2014/main" id="{7BFD7AAE-8FA8-43E3-929F-29A7B3961AF5}"/>
+                <a16:creationId xmlns:a16="http://schemas.microsoft.com/office/drawing/2014/main" xmlns="" id="{7BFD7AAE-8FA8-43E3-929F-29A7B3961AF5}"/>
               </a:ext>
             </a:extLst>
           </p:cNvPr>
@@ -10621,6 +10631,13 @@
   <p:clrMapOvr>
     <a:masterClrMapping/>
   </p:clrMapOvr>
+  <p:timing>
+    <p:tnLst>
+      <p:par>
+        <p:cTn id="1" dur="indefinite" restart="never" nodeType="tmRoot"/>
+      </p:par>
+    </p:tnLst>
+  </p:timing>
 </p:sld>
 </file>
 
@@ -10707,7 +10724,7 @@
           <p:cNvPr id="7" name="Rektangel 6">
             <a:extLst>
               <a:ext uri="{FF2B5EF4-FFF2-40B4-BE49-F238E27FC236}">
-                <a16:creationId xmlns:a16="http://schemas.microsoft.com/office/drawing/2014/main" id="{9F1148A3-89F8-4696-82BA-8301E1248193}"/>
+                <a16:creationId xmlns:a16="http://schemas.microsoft.com/office/drawing/2014/main" xmlns="" id="{9F1148A3-89F8-4696-82BA-8301E1248193}"/>
               </a:ext>
             </a:extLst>
           </p:cNvPr>
@@ -11755,7 +11772,7 @@
           <p:cNvPr id="2" name="Rektangel 1">
             <a:extLst>
               <a:ext uri="{FF2B5EF4-FFF2-40B4-BE49-F238E27FC236}">
-                <a16:creationId xmlns:a16="http://schemas.microsoft.com/office/drawing/2014/main" id="{B23235FA-3C5A-4A80-8FA2-036DAB964921}"/>
+                <a16:creationId xmlns:a16="http://schemas.microsoft.com/office/drawing/2014/main" xmlns="" id="{B23235FA-3C5A-4A80-8FA2-036DAB964921}"/>
               </a:ext>
             </a:extLst>
           </p:cNvPr>
@@ -12711,7 +12728,7 @@
           <p:cNvPr id="5" name="Rektangel 4">
             <a:extLst>
               <a:ext uri="{FF2B5EF4-FFF2-40B4-BE49-F238E27FC236}">
-                <a16:creationId xmlns:a16="http://schemas.microsoft.com/office/drawing/2014/main" id="{9C8DC9AB-4C9A-4307-890A-1742022EB5B5}"/>
+                <a16:creationId xmlns:a16="http://schemas.microsoft.com/office/drawing/2014/main" xmlns="" id="{9C8DC9AB-4C9A-4307-890A-1742022EB5B5}"/>
               </a:ext>
             </a:extLst>
           </p:cNvPr>
@@ -14083,7 +14100,7 @@
           <p:cNvPr id="7" name="Rektangel 6">
             <a:extLst>
               <a:ext uri="{FF2B5EF4-FFF2-40B4-BE49-F238E27FC236}">
-                <a16:creationId xmlns:a16="http://schemas.microsoft.com/office/drawing/2014/main" id="{9F1148A3-89F8-4696-82BA-8301E1248193}"/>
+                <a16:creationId xmlns:a16="http://schemas.microsoft.com/office/drawing/2014/main" xmlns="" id="{9F1148A3-89F8-4696-82BA-8301E1248193}"/>
               </a:ext>
             </a:extLst>
           </p:cNvPr>
@@ -15329,8 +15346,12 @@
           <a:lstStyle/>
           <a:p>
             <a:r>
+              <a:rPr lang="nb-NO" dirty="0" smtClean="0"/>
+              <a:t>Tore </a:t>
+            </a:r>
+            <a:r>
               <a:rPr lang="nb-NO" dirty="0"/>
-              <a:t>Tor Erstad</a:t>
+              <a:t>Erstad</a:t>
             </a:r>
           </a:p>
         </p:txBody>
@@ -15345,6 +15366,13 @@
   <p:clrMapOvr>
     <a:masterClrMapping/>
   </p:clrMapOvr>
+  <p:timing>
+    <p:tnLst>
+      <p:par>
+        <p:cTn id="1" dur="indefinite" restart="never" nodeType="tmRoot"/>
+      </p:par>
+    </p:tnLst>
+  </p:timing>
 </p:sld>
 </file>
 
@@ -15599,7 +15627,15 @@
           <a:p>
             <a:r>
               <a:rPr lang="nb-NO" dirty="0"/>
-              <a:t>Man har en objekt-struktur som består av ulike typer (klasser), og man ønsker å traversere gjennom elementene for å utføre en operasjon som er implementert ulikt for de ulike typene.</a:t>
+              <a:t>Man har en objekt-struktur som består av ulike typer (klasser), og man ønsker å traversere gjennom elementene for å utføre en operasjon som </a:t>
+            </a:r>
+            <a:r>
+              <a:rPr lang="nb-NO" dirty="0" smtClean="0"/>
+              <a:t>må implementeres </a:t>
+            </a:r>
+            <a:r>
+              <a:rPr lang="nb-NO" dirty="0"/>
+              <a:t>ulikt for de ulike typene.</a:t>
             </a:r>
           </a:p>
           <a:p>
@@ -15967,7 +16003,7 @@
           <p:cNvPr id="6" name="Picture 2" descr="Visitor Pattern - UML Class Diagram">
             <a:extLst>
               <a:ext uri="{FF2B5EF4-FFF2-40B4-BE49-F238E27FC236}">
-                <a16:creationId xmlns:a16="http://schemas.microsoft.com/office/drawing/2014/main" id="{6ECB2638-78CB-4DAA-BB71-94163B2EB52E}"/>
+                <a16:creationId xmlns:a16="http://schemas.microsoft.com/office/drawing/2014/main" xmlns="" id="{6ECB2638-78CB-4DAA-BB71-94163B2EB52E}"/>
               </a:ext>
             </a:extLst>
           </p:cNvPr>
@@ -16019,6 +16055,13 @@
   <p:clrMapOvr>
     <a:masterClrMapping/>
   </p:clrMapOvr>
+  <p:timing>
+    <p:tnLst>
+      <p:par>
+        <p:cTn id="1" dur="indefinite" restart="never" nodeType="tmRoot"/>
+      </p:par>
+    </p:tnLst>
+  </p:timing>
 </p:sld>
 </file>
 
@@ -16093,10 +16136,660 @@
   <p:clrMapOvr>
     <a:masterClrMapping/>
   </p:clrMapOvr>
+  <p:timing>
+    <p:tnLst>
+      <p:par>
+        <p:cTn id="1" dur="indefinite" restart="never" nodeType="tmRoot"/>
+      </p:par>
+    </p:tnLst>
+  </p:timing>
 </p:sld>
 </file>
 
 <file path=ppt/slides/slide20.xml><?xml version="1.0" encoding="utf-8"?>
+<p:sld xmlns:a="http://schemas.openxmlformats.org/drawingml/2006/main" xmlns:r="http://schemas.openxmlformats.org/officeDocument/2006/relationships" xmlns:p="http://schemas.openxmlformats.org/presentationml/2006/main">
+  <p:cSld>
+    <p:spTree>
+      <p:nvGrpSpPr>
+        <p:cNvPr id="1" name=""/>
+        <p:cNvGrpSpPr/>
+        <p:nvPr/>
+      </p:nvGrpSpPr>
+      <p:grpSpPr>
+        <a:xfrm>
+          <a:off x="0" y="0"/>
+          <a:ext cx="0" cy="0"/>
+          <a:chOff x="0" y="0"/>
+          <a:chExt cx="0" cy="0"/>
+        </a:xfrm>
+      </p:grpSpPr>
+      <p:sp>
+        <p:nvSpPr>
+          <p:cNvPr id="3" name="Title 2"/>
+          <p:cNvSpPr>
+            <a:spLocks noGrp="1"/>
+          </p:cNvSpPr>
+          <p:nvPr>
+            <p:ph type="title"/>
+          </p:nvPr>
+        </p:nvSpPr>
+        <p:spPr>
+          <a:xfrm>
+            <a:off x="1234800" y="365126"/>
+            <a:ext cx="3237809" cy="963024"/>
+          </a:xfrm>
+        </p:spPr>
+        <p:txBody>
+          <a:bodyPr/>
+          <a:lstStyle/>
+          <a:p>
+            <a:r>
+              <a:rPr lang="nb-NO" dirty="0"/>
+              <a:t>Visitor - struktur</a:t>
+            </a:r>
+          </a:p>
+        </p:txBody>
+      </p:sp>
+      <p:pic>
+        <p:nvPicPr>
+          <p:cNvPr id="6" name="Picture 2" descr="Visitor Pattern - UML Class Diagram">
+            <a:extLst>
+              <a:ext uri="{FF2B5EF4-FFF2-40B4-BE49-F238E27FC236}">
+                <a16:creationId xmlns:a16="http://schemas.microsoft.com/office/drawing/2014/main" xmlns="" id="{6ECB2638-78CB-4DAA-BB71-94163B2EB52E}"/>
+              </a:ext>
+            </a:extLst>
+          </p:cNvPr>
+          <p:cNvPicPr>
+            <a:picLocks noChangeAspect="1" noChangeArrowheads="1"/>
+          </p:cNvPicPr>
+          <p:nvPr/>
+        </p:nvPicPr>
+        <p:blipFill>
+          <a:blip r:embed="rId2">
+            <a:extLst>
+              <a:ext uri="{28A0092B-C50C-407E-A947-70E740481C1C}">
+                <a14:useLocalDpi xmlns:a14="http://schemas.microsoft.com/office/drawing/2010/main" val="0"/>
+              </a:ext>
+            </a:extLst>
+          </a:blip>
+          <a:srcRect/>
+          <a:stretch>
+            <a:fillRect/>
+          </a:stretch>
+        </p:blipFill>
+        <p:spPr bwMode="auto">
+          <a:xfrm>
+            <a:off x="4684432" y="611539"/>
+            <a:ext cx="5532296" cy="5565424"/>
+          </a:xfrm>
+          <a:prstGeom prst="rect">
+            <a:avLst/>
+          </a:prstGeom>
+          <a:noFill/>
+          <a:extLst>
+            <a:ext uri="{909E8E84-426E-40DD-AFC4-6F175D3DCCD1}">
+              <a14:hiddenFill xmlns:a14="http://schemas.microsoft.com/office/drawing/2010/main">
+                <a:solidFill>
+                  <a:srgbClr val="FFFFFF"/>
+                </a:solidFill>
+              </a14:hiddenFill>
+            </a:ext>
+          </a:extLst>
+        </p:spPr>
+      </p:pic>
+      <p:sp>
+        <p:nvSpPr>
+          <p:cNvPr id="4" name="Rectangle 3"/>
+          <p:cNvSpPr/>
+          <p:nvPr/>
+        </p:nvSpPr>
+        <p:spPr>
+          <a:xfrm>
+            <a:off x="5198076" y="3665838"/>
+            <a:ext cx="4572000" cy="2388973"/>
+          </a:xfrm>
+          <a:prstGeom prst="rect">
+            <a:avLst/>
+          </a:prstGeom>
+          <a:noFill/>
+          <a:ln w="38100">
+            <a:solidFill>
+              <a:srgbClr val="FF0000"/>
+            </a:solidFill>
+          </a:ln>
+        </p:spPr>
+        <p:style>
+          <a:lnRef idx="2">
+            <a:schemeClr val="accent1">
+              <a:shade val="50000"/>
+            </a:schemeClr>
+          </a:lnRef>
+          <a:fillRef idx="1">
+            <a:schemeClr val="accent1"/>
+          </a:fillRef>
+          <a:effectRef idx="0">
+            <a:schemeClr val="accent1"/>
+          </a:effectRef>
+          <a:fontRef idx="minor">
+            <a:schemeClr val="lt1"/>
+          </a:fontRef>
+        </p:style>
+        <p:txBody>
+          <a:bodyPr rtlCol="0" anchor="ctr"/>
+          <a:lstStyle/>
+          <a:p>
+            <a:pPr algn="ctr"/>
+            <a:endParaRPr lang="nb-NO">
+              <a:solidFill>
+                <a:schemeClr val="bg1"/>
+              </a:solidFill>
+            </a:endParaRPr>
+          </a:p>
+        </p:txBody>
+      </p:sp>
+    </p:spTree>
+    <p:extLst>
+      <p:ext uri="{BB962C8B-B14F-4D97-AF65-F5344CB8AC3E}">
+        <p14:creationId xmlns:p14="http://schemas.microsoft.com/office/powerpoint/2010/main" val="1904773112"/>
+      </p:ext>
+    </p:extLst>
+  </p:cSld>
+  <p:clrMapOvr>
+    <a:masterClrMapping/>
+  </p:clrMapOvr>
+  <p:timing>
+    <p:tnLst>
+      <p:par>
+        <p:cTn id="1" dur="indefinite" restart="never" nodeType="tmRoot"/>
+      </p:par>
+    </p:tnLst>
+  </p:timing>
+</p:sld>
+</file>
+
+<file path=ppt/slides/slide21.xml><?xml version="1.0" encoding="utf-8"?>
+<p:sld xmlns:a="http://schemas.openxmlformats.org/drawingml/2006/main" xmlns:r="http://schemas.openxmlformats.org/officeDocument/2006/relationships" xmlns:p="http://schemas.openxmlformats.org/presentationml/2006/main">
+  <p:cSld>
+    <p:spTree>
+      <p:nvGrpSpPr>
+        <p:cNvPr id="1" name=""/>
+        <p:cNvGrpSpPr/>
+        <p:nvPr/>
+      </p:nvGrpSpPr>
+      <p:grpSpPr>
+        <a:xfrm>
+          <a:off x="0" y="0"/>
+          <a:ext cx="0" cy="0"/>
+          <a:chOff x="0" y="0"/>
+          <a:chExt cx="0" cy="0"/>
+        </a:xfrm>
+      </p:grpSpPr>
+      <p:sp>
+        <p:nvSpPr>
+          <p:cNvPr id="3" name="Title 2"/>
+          <p:cNvSpPr>
+            <a:spLocks noGrp="1"/>
+          </p:cNvSpPr>
+          <p:nvPr>
+            <p:ph type="title"/>
+          </p:nvPr>
+        </p:nvSpPr>
+        <p:spPr>
+          <a:xfrm>
+            <a:off x="1234800" y="365126"/>
+            <a:ext cx="3237809" cy="963024"/>
+          </a:xfrm>
+        </p:spPr>
+        <p:txBody>
+          <a:bodyPr/>
+          <a:lstStyle/>
+          <a:p>
+            <a:r>
+              <a:rPr lang="nb-NO" dirty="0"/>
+              <a:t>Visitor - struktur</a:t>
+            </a:r>
+          </a:p>
+        </p:txBody>
+      </p:sp>
+      <p:pic>
+        <p:nvPicPr>
+          <p:cNvPr id="6" name="Picture 2" descr="Visitor Pattern - UML Class Diagram">
+            <a:extLst>
+              <a:ext uri="{FF2B5EF4-FFF2-40B4-BE49-F238E27FC236}">
+                <a16:creationId xmlns:a16="http://schemas.microsoft.com/office/drawing/2014/main" xmlns="" id="{6ECB2638-78CB-4DAA-BB71-94163B2EB52E}"/>
+              </a:ext>
+            </a:extLst>
+          </p:cNvPr>
+          <p:cNvPicPr>
+            <a:picLocks noChangeAspect="1" noChangeArrowheads="1"/>
+          </p:cNvPicPr>
+          <p:nvPr/>
+        </p:nvPicPr>
+        <p:blipFill>
+          <a:blip r:embed="rId2">
+            <a:extLst>
+              <a:ext uri="{28A0092B-C50C-407E-A947-70E740481C1C}">
+                <a14:useLocalDpi xmlns:a14="http://schemas.microsoft.com/office/drawing/2010/main" val="0"/>
+              </a:ext>
+            </a:extLst>
+          </a:blip>
+          <a:srcRect/>
+          <a:stretch>
+            <a:fillRect/>
+          </a:stretch>
+        </p:blipFill>
+        <p:spPr bwMode="auto">
+          <a:xfrm>
+            <a:off x="4684432" y="611539"/>
+            <a:ext cx="5532296" cy="5565424"/>
+          </a:xfrm>
+          <a:prstGeom prst="rect">
+            <a:avLst/>
+          </a:prstGeom>
+          <a:noFill/>
+          <a:extLst>
+            <a:ext uri="{909E8E84-426E-40DD-AFC4-6F175D3DCCD1}">
+              <a14:hiddenFill xmlns:a14="http://schemas.microsoft.com/office/drawing/2010/main">
+                <a:solidFill>
+                  <a:srgbClr val="FFFFFF"/>
+                </a:solidFill>
+              </a14:hiddenFill>
+            </a:ext>
+          </a:extLst>
+        </p:spPr>
+      </p:pic>
+      <p:cxnSp>
+        <p:nvCxnSpPr>
+          <p:cNvPr id="5" name="Straight Connector 4"/>
+          <p:cNvCxnSpPr/>
+          <p:nvPr/>
+        </p:nvCxnSpPr>
+        <p:spPr>
+          <a:xfrm>
+            <a:off x="6997566" y="1001027"/>
+            <a:ext cx="3031958" cy="9626"/>
+          </a:xfrm>
+          <a:prstGeom prst="line">
+            <a:avLst/>
+          </a:prstGeom>
+          <a:ln w="34925">
+            <a:solidFill>
+              <a:srgbClr val="FF0000"/>
+            </a:solidFill>
+          </a:ln>
+        </p:spPr>
+        <p:style>
+          <a:lnRef idx="1">
+            <a:schemeClr val="accent1"/>
+          </a:lnRef>
+          <a:fillRef idx="0">
+            <a:schemeClr val="accent1"/>
+          </a:fillRef>
+          <a:effectRef idx="0">
+            <a:schemeClr val="accent1"/>
+          </a:effectRef>
+          <a:fontRef idx="minor">
+            <a:schemeClr val="tx1"/>
+          </a:fontRef>
+        </p:style>
+      </p:cxnSp>
+      <p:cxnSp>
+        <p:nvCxnSpPr>
+          <p:cNvPr id="7" name="Straight Connector 6"/>
+          <p:cNvCxnSpPr/>
+          <p:nvPr/>
+        </p:nvCxnSpPr>
+        <p:spPr>
+          <a:xfrm>
+            <a:off x="5186413" y="3588995"/>
+            <a:ext cx="4843111" cy="0"/>
+          </a:xfrm>
+          <a:prstGeom prst="line">
+            <a:avLst/>
+          </a:prstGeom>
+          <a:ln w="34925">
+            <a:solidFill>
+              <a:srgbClr val="FF0000"/>
+            </a:solidFill>
+          </a:ln>
+        </p:spPr>
+        <p:style>
+          <a:lnRef idx="1">
+            <a:schemeClr val="accent1"/>
+          </a:lnRef>
+          <a:fillRef idx="0">
+            <a:schemeClr val="accent1"/>
+          </a:fillRef>
+          <a:effectRef idx="0">
+            <a:schemeClr val="accent1"/>
+          </a:effectRef>
+          <a:fontRef idx="minor">
+            <a:schemeClr val="tx1"/>
+          </a:fontRef>
+        </p:style>
+      </p:cxnSp>
+      <p:cxnSp>
+        <p:nvCxnSpPr>
+          <p:cNvPr id="9" name="Straight Connector 8"/>
+          <p:cNvCxnSpPr/>
+          <p:nvPr/>
+        </p:nvCxnSpPr>
+        <p:spPr>
+          <a:xfrm flipV="1">
+            <a:off x="10029524" y="1001027"/>
+            <a:ext cx="0" cy="2587968"/>
+          </a:xfrm>
+          <a:prstGeom prst="line">
+            <a:avLst/>
+          </a:prstGeom>
+          <a:ln w="34925">
+            <a:solidFill>
+              <a:srgbClr val="FF0000"/>
+            </a:solidFill>
+          </a:ln>
+        </p:spPr>
+        <p:style>
+          <a:lnRef idx="1">
+            <a:schemeClr val="accent1"/>
+          </a:lnRef>
+          <a:fillRef idx="0">
+            <a:schemeClr val="accent1"/>
+          </a:fillRef>
+          <a:effectRef idx="0">
+            <a:schemeClr val="accent1"/>
+          </a:effectRef>
+          <a:fontRef idx="minor">
+            <a:schemeClr val="tx1"/>
+          </a:fontRef>
+        </p:style>
+      </p:cxnSp>
+      <p:cxnSp>
+        <p:nvCxnSpPr>
+          <p:cNvPr id="13" name="Straight Connector 12"/>
+          <p:cNvCxnSpPr/>
+          <p:nvPr/>
+        </p:nvCxnSpPr>
+        <p:spPr>
+          <a:xfrm flipV="1">
+            <a:off x="5186413" y="2117558"/>
+            <a:ext cx="1811153" cy="9625"/>
+          </a:xfrm>
+          <a:prstGeom prst="line">
+            <a:avLst/>
+          </a:prstGeom>
+          <a:ln w="34925">
+            <a:solidFill>
+              <a:srgbClr val="FF0000"/>
+            </a:solidFill>
+          </a:ln>
+        </p:spPr>
+        <p:style>
+          <a:lnRef idx="1">
+            <a:schemeClr val="accent1"/>
+          </a:lnRef>
+          <a:fillRef idx="0">
+            <a:schemeClr val="accent1"/>
+          </a:fillRef>
+          <a:effectRef idx="0">
+            <a:schemeClr val="accent1"/>
+          </a:effectRef>
+          <a:fontRef idx="minor">
+            <a:schemeClr val="tx1"/>
+          </a:fontRef>
+        </p:style>
+      </p:cxnSp>
+      <p:cxnSp>
+        <p:nvCxnSpPr>
+          <p:cNvPr id="16" name="Straight Connector 15"/>
+          <p:cNvCxnSpPr/>
+          <p:nvPr/>
+        </p:nvCxnSpPr>
+        <p:spPr>
+          <a:xfrm flipV="1">
+            <a:off x="6997566" y="1010654"/>
+            <a:ext cx="0" cy="1106904"/>
+          </a:xfrm>
+          <a:prstGeom prst="line">
+            <a:avLst/>
+          </a:prstGeom>
+          <a:ln w="34925">
+            <a:solidFill>
+              <a:srgbClr val="FF0000"/>
+            </a:solidFill>
+          </a:ln>
+        </p:spPr>
+        <p:style>
+          <a:lnRef idx="1">
+            <a:schemeClr val="accent1"/>
+          </a:lnRef>
+          <a:fillRef idx="0">
+            <a:schemeClr val="accent1"/>
+          </a:fillRef>
+          <a:effectRef idx="0">
+            <a:schemeClr val="accent1"/>
+          </a:effectRef>
+          <a:fontRef idx="minor">
+            <a:schemeClr val="tx1"/>
+          </a:fontRef>
+        </p:style>
+      </p:cxnSp>
+      <p:cxnSp>
+        <p:nvCxnSpPr>
+          <p:cNvPr id="19" name="Straight Connector 18"/>
+          <p:cNvCxnSpPr/>
+          <p:nvPr/>
+        </p:nvCxnSpPr>
+        <p:spPr>
+          <a:xfrm>
+            <a:off x="5186413" y="2127183"/>
+            <a:ext cx="0" cy="1461812"/>
+          </a:xfrm>
+          <a:prstGeom prst="line">
+            <a:avLst/>
+          </a:prstGeom>
+          <a:ln w="34925">
+            <a:solidFill>
+              <a:srgbClr val="FF0000"/>
+            </a:solidFill>
+          </a:ln>
+        </p:spPr>
+        <p:style>
+          <a:lnRef idx="1">
+            <a:schemeClr val="accent1"/>
+          </a:lnRef>
+          <a:fillRef idx="0">
+            <a:schemeClr val="accent1"/>
+          </a:fillRef>
+          <a:effectRef idx="0">
+            <a:schemeClr val="accent1"/>
+          </a:effectRef>
+          <a:fontRef idx="minor">
+            <a:schemeClr val="tx1"/>
+          </a:fontRef>
+        </p:style>
+      </p:cxnSp>
+    </p:spTree>
+    <p:extLst>
+      <p:ext uri="{BB962C8B-B14F-4D97-AF65-F5344CB8AC3E}">
+        <p14:creationId xmlns:p14="http://schemas.microsoft.com/office/powerpoint/2010/main" val="3316980445"/>
+      </p:ext>
+    </p:extLst>
+  </p:cSld>
+  <p:clrMapOvr>
+    <a:masterClrMapping/>
+  </p:clrMapOvr>
+  <p:timing>
+    <p:tnLst>
+      <p:par>
+        <p:cTn id="1" dur="indefinite" restart="never" nodeType="tmRoot"/>
+      </p:par>
+    </p:tnLst>
+  </p:timing>
+</p:sld>
+</file>
+
+<file path=ppt/slides/slide22.xml><?xml version="1.0" encoding="utf-8"?>
+<p:sld xmlns:a="http://schemas.openxmlformats.org/drawingml/2006/main" xmlns:r="http://schemas.openxmlformats.org/officeDocument/2006/relationships" xmlns:p="http://schemas.openxmlformats.org/presentationml/2006/main">
+  <p:cSld>
+    <p:spTree>
+      <p:nvGrpSpPr>
+        <p:cNvPr id="1" name=""/>
+        <p:cNvGrpSpPr/>
+        <p:nvPr/>
+      </p:nvGrpSpPr>
+      <p:grpSpPr>
+        <a:xfrm>
+          <a:off x="0" y="0"/>
+          <a:ext cx="0" cy="0"/>
+          <a:chOff x="0" y="0"/>
+          <a:chExt cx="0" cy="0"/>
+        </a:xfrm>
+      </p:grpSpPr>
+      <p:sp>
+        <p:nvSpPr>
+          <p:cNvPr id="3" name="Title 2"/>
+          <p:cNvSpPr>
+            <a:spLocks noGrp="1"/>
+          </p:cNvSpPr>
+          <p:nvPr>
+            <p:ph type="title"/>
+          </p:nvPr>
+        </p:nvSpPr>
+        <p:spPr>
+          <a:xfrm>
+            <a:off x="1234800" y="365126"/>
+            <a:ext cx="3237809" cy="963024"/>
+          </a:xfrm>
+        </p:spPr>
+        <p:txBody>
+          <a:bodyPr/>
+          <a:lstStyle/>
+          <a:p>
+            <a:r>
+              <a:rPr lang="nb-NO" dirty="0"/>
+              <a:t>Visitor - struktur</a:t>
+            </a:r>
+          </a:p>
+        </p:txBody>
+      </p:sp>
+      <p:pic>
+        <p:nvPicPr>
+          <p:cNvPr id="6" name="Picture 2" descr="Visitor Pattern - UML Class Diagram">
+            <a:extLst>
+              <a:ext uri="{FF2B5EF4-FFF2-40B4-BE49-F238E27FC236}">
+                <a16:creationId xmlns:a16="http://schemas.microsoft.com/office/drawing/2014/main" xmlns="" id="{6ECB2638-78CB-4DAA-BB71-94163B2EB52E}"/>
+              </a:ext>
+            </a:extLst>
+          </p:cNvPr>
+          <p:cNvPicPr>
+            <a:picLocks noChangeAspect="1" noChangeArrowheads="1"/>
+          </p:cNvPicPr>
+          <p:nvPr/>
+        </p:nvPicPr>
+        <p:blipFill>
+          <a:blip r:embed="rId2">
+            <a:extLst>
+              <a:ext uri="{28A0092B-C50C-407E-A947-70E740481C1C}">
+                <a14:useLocalDpi xmlns:a14="http://schemas.microsoft.com/office/drawing/2010/main" val="0"/>
+              </a:ext>
+            </a:extLst>
+          </a:blip>
+          <a:srcRect/>
+          <a:stretch>
+            <a:fillRect/>
+          </a:stretch>
+        </p:blipFill>
+        <p:spPr bwMode="auto">
+          <a:xfrm>
+            <a:off x="4684432" y="611539"/>
+            <a:ext cx="5532296" cy="5565424"/>
+          </a:xfrm>
+          <a:prstGeom prst="rect">
+            <a:avLst/>
+          </a:prstGeom>
+          <a:noFill/>
+          <a:extLst>
+            <a:ext uri="{909E8E84-426E-40DD-AFC4-6F175D3DCCD1}">
+              <a14:hiddenFill xmlns:a14="http://schemas.microsoft.com/office/drawing/2010/main">
+                <a:solidFill>
+                  <a:srgbClr val="FFFFFF"/>
+                </a:solidFill>
+              </a14:hiddenFill>
+            </a:ext>
+          </a:extLst>
+        </p:spPr>
+      </p:pic>
+      <p:sp>
+        <p:nvSpPr>
+          <p:cNvPr id="2" name="Rectangle 1"/>
+          <p:cNvSpPr/>
+          <p:nvPr/>
+        </p:nvSpPr>
+        <p:spPr>
+          <a:xfrm>
+            <a:off x="5178392" y="1155032"/>
+            <a:ext cx="1434164" cy="721894"/>
+          </a:xfrm>
+          <a:prstGeom prst="rect">
+            <a:avLst/>
+          </a:prstGeom>
+          <a:noFill/>
+          <a:ln w="38100">
+            <a:solidFill>
+              <a:srgbClr val="FF0000"/>
+            </a:solidFill>
+          </a:ln>
+        </p:spPr>
+        <p:style>
+          <a:lnRef idx="2">
+            <a:schemeClr val="accent1">
+              <a:shade val="50000"/>
+            </a:schemeClr>
+          </a:lnRef>
+          <a:fillRef idx="1">
+            <a:schemeClr val="accent1"/>
+          </a:fillRef>
+          <a:effectRef idx="0">
+            <a:schemeClr val="accent1"/>
+          </a:effectRef>
+          <a:fontRef idx="minor">
+            <a:schemeClr val="lt1"/>
+          </a:fontRef>
+        </p:style>
+        <p:txBody>
+          <a:bodyPr rtlCol="0" anchor="ctr"/>
+          <a:lstStyle/>
+          <a:p>
+            <a:pPr algn="ctr"/>
+            <a:endParaRPr lang="nb-NO">
+              <a:solidFill>
+                <a:schemeClr val="bg1"/>
+              </a:solidFill>
+            </a:endParaRPr>
+          </a:p>
+        </p:txBody>
+      </p:sp>
+    </p:spTree>
+    <p:extLst>
+      <p:ext uri="{BB962C8B-B14F-4D97-AF65-F5344CB8AC3E}">
+        <p14:creationId xmlns:p14="http://schemas.microsoft.com/office/powerpoint/2010/main" val="1447721741"/>
+      </p:ext>
+    </p:extLst>
+  </p:cSld>
+  <p:clrMapOvr>
+    <a:masterClrMapping/>
+  </p:clrMapOvr>
+  <p:timing>
+    <p:tnLst>
+      <p:par>
+        <p:cTn id="1" dur="indefinite" restart="never" nodeType="tmRoot"/>
+      </p:par>
+    </p:tnLst>
+  </p:timing>
+</p:sld>
+</file>
+
+<file path=ppt/slides/slide23.xml><?xml version="1.0" encoding="utf-8"?>
 <p:sld xmlns:a="http://schemas.openxmlformats.org/drawingml/2006/main" xmlns:r="http://schemas.openxmlformats.org/officeDocument/2006/relationships" xmlns:p="http://schemas.openxmlformats.org/presentationml/2006/main">
   <p:cSld>
     <p:spTree>
@@ -16175,7 +16868,7 @@
           <p:cNvPr id="5" name="Rektangel 1">
             <a:extLst>
               <a:ext uri="{FF2B5EF4-FFF2-40B4-BE49-F238E27FC236}">
-                <a16:creationId xmlns:a16="http://schemas.microsoft.com/office/drawing/2014/main" id="{3BEF0AC1-9401-4053-82E5-96A4AC358384}"/>
+                <a16:creationId xmlns:a16="http://schemas.microsoft.com/office/drawing/2014/main" xmlns="" id="{3BEF0AC1-9401-4053-82E5-96A4AC358384}"/>
               </a:ext>
             </a:extLst>
           </p:cNvPr>
@@ -17671,7 +18364,7 @@
 </p:sld>
 </file>
 
-<file path=ppt/slides/slide21.xml><?xml version="1.0" encoding="utf-8"?>
+<file path=ppt/slides/slide24.xml><?xml version="1.0" encoding="utf-8"?>
 <p:sld xmlns:a="http://schemas.openxmlformats.org/drawingml/2006/main" xmlns:r="http://schemas.openxmlformats.org/officeDocument/2006/relationships" xmlns:p="http://schemas.openxmlformats.org/presentationml/2006/main">
   <p:cSld>
     <p:spTree>
@@ -17750,7 +18443,7 @@
           <p:cNvPr id="7" name="Rektangel 1">
             <a:extLst>
               <a:ext uri="{FF2B5EF4-FFF2-40B4-BE49-F238E27FC236}">
-                <a16:creationId xmlns:a16="http://schemas.microsoft.com/office/drawing/2014/main" id="{63988271-58E0-4D95-9B6F-CBA92D24F708}"/>
+                <a16:creationId xmlns:a16="http://schemas.microsoft.com/office/drawing/2014/main" xmlns="" id="{63988271-58E0-4D95-9B6F-CBA92D24F708}"/>
               </a:ext>
             </a:extLst>
           </p:cNvPr>
@@ -19017,7 +19710,7 @@
 </p:sld>
 </file>
 
-<file path=ppt/slides/slide22.xml><?xml version="1.0" encoding="utf-8"?>
+<file path=ppt/slides/slide25.xml><?xml version="1.0" encoding="utf-8"?>
 <p:sld xmlns:a="http://schemas.openxmlformats.org/drawingml/2006/main" xmlns:r="http://schemas.openxmlformats.org/officeDocument/2006/relationships" xmlns:p="http://schemas.openxmlformats.org/presentationml/2006/main">
   <p:cSld>
     <p:spTree>
@@ -19096,7 +19789,7 @@
           <p:cNvPr id="5" name="Rektangel 1">
             <a:extLst>
               <a:ext uri="{FF2B5EF4-FFF2-40B4-BE49-F238E27FC236}">
-                <a16:creationId xmlns:a16="http://schemas.microsoft.com/office/drawing/2014/main" id="{FA736312-75CA-4887-9F29-9AF851C77593}"/>
+                <a16:creationId xmlns:a16="http://schemas.microsoft.com/office/drawing/2014/main" xmlns="" id="{FA736312-75CA-4887-9F29-9AF851C77593}"/>
               </a:ext>
             </a:extLst>
           </p:cNvPr>
@@ -20474,7 +21167,7 @@
 </p:sld>
 </file>
 
-<file path=ppt/slides/slide23.xml><?xml version="1.0" encoding="utf-8"?>
+<file path=ppt/slides/slide26.xml><?xml version="1.0" encoding="utf-8"?>
 <p:sld xmlns:a="http://schemas.openxmlformats.org/drawingml/2006/main" xmlns:r="http://schemas.openxmlformats.org/officeDocument/2006/relationships" xmlns:p="http://schemas.openxmlformats.org/presentationml/2006/main">
   <p:cSld>
     <p:spTree>
@@ -20849,7 +21542,7 @@
 </p:sld>
 </file>
 
-<file path=ppt/slides/slide24.xml><?xml version="1.0" encoding="utf-8"?>
+<file path=ppt/slides/slide27.xml><?xml version="1.0" encoding="utf-8"?>
 <p:sld xmlns:a="http://schemas.openxmlformats.org/drawingml/2006/main" xmlns:r="http://schemas.openxmlformats.org/officeDocument/2006/relationships" xmlns:p="http://schemas.openxmlformats.org/presentationml/2006/main">
   <p:cSld>
     <p:spTree>
@@ -20926,10 +21619,17 @@
   <p:clrMapOvr>
     <a:masterClrMapping/>
   </p:clrMapOvr>
+  <p:timing>
+    <p:tnLst>
+      <p:par>
+        <p:cTn id="1" dur="indefinite" restart="never" nodeType="tmRoot"/>
+      </p:par>
+    </p:tnLst>
+  </p:timing>
 </p:sld>
 </file>
 
-<file path=ppt/slides/slide25.xml><?xml version="1.0" encoding="utf-8"?>
+<file path=ppt/slides/slide28.xml><?xml version="1.0" encoding="utf-8"?>
 <p:sld xmlns:a="http://schemas.openxmlformats.org/drawingml/2006/main" xmlns:r="http://schemas.openxmlformats.org/officeDocument/2006/relationships" xmlns:p="http://schemas.openxmlformats.org/presentationml/2006/main">
   <p:cSld>
     <p:spTree>
@@ -21014,10 +21714,17 @@
   <p:clrMapOvr>
     <a:masterClrMapping/>
   </p:clrMapOvr>
+  <p:timing>
+    <p:tnLst>
+      <p:par>
+        <p:cTn id="1" dur="indefinite" restart="never" nodeType="tmRoot"/>
+      </p:par>
+    </p:tnLst>
+  </p:timing>
 </p:sld>
 </file>
 
-<file path=ppt/slides/slide26.xml><?xml version="1.0" encoding="utf-8"?>
+<file path=ppt/slides/slide29.xml><?xml version="1.0" encoding="utf-8"?>
 <p:sld xmlns:a="http://schemas.openxmlformats.org/drawingml/2006/main" xmlns:r="http://schemas.openxmlformats.org/officeDocument/2006/relationships" xmlns:p="http://schemas.openxmlformats.org/presentationml/2006/main">
   <p:cSld>
     <p:spTree>
@@ -21177,6 +21884,13 @@
   <p:clrMapOvr>
     <a:masterClrMapping/>
   </p:clrMapOvr>
+  <p:timing>
+    <p:tnLst>
+      <p:par>
+        <p:cTn id="1" dur="indefinite" restart="never" nodeType="tmRoot"/>
+      </p:par>
+    </p:tnLst>
+  </p:timing>
 </p:sld>
 </file>
 
@@ -21953,6 +22667,13 @@
   <p:clrMapOvr>
     <a:masterClrMapping/>
   </p:clrMapOvr>
+  <p:timing>
+    <p:tnLst>
+      <p:par>
+        <p:cTn id="1" dur="indefinite" restart="never" nodeType="tmRoot"/>
+      </p:par>
+    </p:tnLst>
+  </p:timing>
 </p:sld>
 </file>
 
@@ -22051,6 +22772,13 @@
   <p:clrMapOvr>
     <a:masterClrMapping/>
   </p:clrMapOvr>
+  <p:timing>
+    <p:tnLst>
+      <p:par>
+        <p:cTn id="1" dur="indefinite" restart="never" nodeType="tmRoot"/>
+      </p:par>
+    </p:tnLst>
+  </p:timing>
 </p:sld>
 </file>
 
@@ -22126,6 +22854,13 @@
   <p:clrMapOvr>
     <a:masterClrMapping/>
   </p:clrMapOvr>
+  <p:timing>
+    <p:tnLst>
+      <p:par>
+        <p:cTn id="1" dur="indefinite" restart="never" nodeType="tmRoot"/>
+      </p:par>
+    </p:tnLst>
+  </p:timing>
 </p:sld>
 </file>
 
@@ -24507,61 +25242,6 @@
 </file>
 
 <file path=customXml/item1.xml><?xml version="1.0" encoding="utf-8"?>
-<?mso-contentType ?>
-<FormTemplates xmlns="http://schemas.microsoft.com/sharepoint/v3/contenttype/forms">
-  <Display>DocumentLibraryForm</Display>
-  <Edit>DocumentLibraryForm</Edit>
-  <New>DocumentLibraryForm</New>
-</FormTemplates>
-</file>
-
-<file path=customXml/item2.xml><?xml version="1.0" encoding="utf-8"?>
-<?mso-contentType ?>
-<spe:Receivers xmlns:spe="http://schemas.microsoft.com/sharepoint/events">
-  <Receiver>
-    <Name>Document ID Generator</Name>
-    <Synchronization>Synchronous</Synchronization>
-    <Type>10001</Type>
-    <SequenceNumber>1000</SequenceNumber>
-    <Assembly>Microsoft.Office.DocumentManagement, Version=14.0.0.0, Culture=neutral, PublicKeyToken=71e9bce111e9429c</Assembly>
-    <Class>Microsoft.Office.DocumentManagement.Internal.DocIdHandler</Class>
-    <Data/>
-    <Filter/>
-  </Receiver>
-  <Receiver>
-    <Name>Document ID Generator</Name>
-    <Synchronization>Synchronous</Synchronization>
-    <Type>10002</Type>
-    <SequenceNumber>1001</SequenceNumber>
-    <Assembly>Microsoft.Office.DocumentManagement, Version=14.0.0.0, Culture=neutral, PublicKeyToken=71e9bce111e9429c</Assembly>
-    <Class>Microsoft.Office.DocumentManagement.Internal.DocIdHandler</Class>
-    <Data/>
-    <Filter/>
-  </Receiver>
-  <Receiver>
-    <Name>Document ID Generator</Name>
-    <Synchronization>Synchronous</Synchronization>
-    <Type>10004</Type>
-    <SequenceNumber>1002</SequenceNumber>
-    <Assembly>Microsoft.Office.DocumentManagement, Version=14.0.0.0, Culture=neutral, PublicKeyToken=71e9bce111e9429c</Assembly>
-    <Class>Microsoft.Office.DocumentManagement.Internal.DocIdHandler</Class>
-    <Data/>
-    <Filter/>
-  </Receiver>
-  <Receiver>
-    <Name>Document ID Generator</Name>
-    <Synchronization>Synchronous</Synchronization>
-    <Type>10006</Type>
-    <SequenceNumber>1003</SequenceNumber>
-    <Assembly>Microsoft.Office.DocumentManagement, Version=14.0.0.0, Culture=neutral, PublicKeyToken=71e9bce111e9429c</Assembly>
-    <Class>Microsoft.Office.DocumentManagement.Internal.DocIdHandler</Class>
-    <Data/>
-    <Filter/>
-  </Receiver>
-</spe:Receivers>
-</file>
-
-<file path=customXml/item3.xml><?xml version="1.0" encoding="utf-8"?>
 <ct:contentTypeSchema xmlns:ct="http://schemas.microsoft.com/office/2006/metadata/contentType" xmlns:ma="http://schemas.microsoft.com/office/2006/metadata/properties/metaAttributes" ct:_="" ma:_="" ma:contentTypeName="Document" ma:contentTypeID="0x0101006DE77A4C69F7B04F983EB828CF8C5433" ma:contentTypeVersion="2" ma:contentTypeDescription="Create a new document." ma:contentTypeScope="" ma:versionID="3f88a36eb5d68a1319bea6a26a0634f9">
   <xsd:schema xmlns:xsd="http://www.w3.org/2001/XMLSchema" xmlns:xs="http://www.w3.org/2001/XMLSchema" xmlns:p="http://schemas.microsoft.com/office/2006/metadata/properties" xmlns:ns1="http://schemas.microsoft.com/sharepoint/v3" xmlns:ns2="cd7095a3-97f1-4663-a71f-a762e9d8a5de" targetNamespace="http://schemas.microsoft.com/office/2006/metadata/properties" ma:root="true" ma:fieldsID="12e73613dd42fd77c3af4275080e49b8" ns1:_="" ns2:_="">
     <xsd:import namespace="http://schemas.microsoft.com/sharepoint/v3"/>
@@ -24723,6 +25403,61 @@
 </ct:contentTypeSchema>
 </file>
 
+<file path=customXml/item2.xml><?xml version="1.0" encoding="utf-8"?>
+<?mso-contentType ?>
+<spe:Receivers xmlns:spe="http://schemas.microsoft.com/sharepoint/events">
+  <Receiver>
+    <Name>Document ID Generator</Name>
+    <Synchronization>Synchronous</Synchronization>
+    <Type>10001</Type>
+    <SequenceNumber>1000</SequenceNumber>
+    <Assembly>Microsoft.Office.DocumentManagement, Version=14.0.0.0, Culture=neutral, PublicKeyToken=71e9bce111e9429c</Assembly>
+    <Class>Microsoft.Office.DocumentManagement.Internal.DocIdHandler</Class>
+    <Data/>
+    <Filter/>
+  </Receiver>
+  <Receiver>
+    <Name>Document ID Generator</Name>
+    <Synchronization>Synchronous</Synchronization>
+    <Type>10002</Type>
+    <SequenceNumber>1001</SequenceNumber>
+    <Assembly>Microsoft.Office.DocumentManagement, Version=14.0.0.0, Culture=neutral, PublicKeyToken=71e9bce111e9429c</Assembly>
+    <Class>Microsoft.Office.DocumentManagement.Internal.DocIdHandler</Class>
+    <Data/>
+    <Filter/>
+  </Receiver>
+  <Receiver>
+    <Name>Document ID Generator</Name>
+    <Synchronization>Synchronous</Synchronization>
+    <Type>10004</Type>
+    <SequenceNumber>1002</SequenceNumber>
+    <Assembly>Microsoft.Office.DocumentManagement, Version=14.0.0.0, Culture=neutral, PublicKeyToken=71e9bce111e9429c</Assembly>
+    <Class>Microsoft.Office.DocumentManagement.Internal.DocIdHandler</Class>
+    <Data/>
+    <Filter/>
+  </Receiver>
+  <Receiver>
+    <Name>Document ID Generator</Name>
+    <Synchronization>Synchronous</Synchronization>
+    <Type>10006</Type>
+    <SequenceNumber>1003</SequenceNumber>
+    <Assembly>Microsoft.Office.DocumentManagement, Version=14.0.0.0, Culture=neutral, PublicKeyToken=71e9bce111e9429c</Assembly>
+    <Class>Microsoft.Office.DocumentManagement.Internal.DocIdHandler</Class>
+    <Data/>
+    <Filter/>
+  </Receiver>
+</spe:Receivers>
+</file>
+
+<file path=customXml/item3.xml><?xml version="1.0" encoding="utf-8"?>
+<?mso-contentType ?>
+<FormTemplates xmlns="http://schemas.microsoft.com/sharepoint/v3/contenttype/forms">
+  <Display>DocumentLibraryForm</Display>
+  <Edit>DocumentLibraryForm</Edit>
+  <New>DocumentLibraryForm</New>
+</FormTemplates>
+</file>
+
 <file path=customXml/item4.xml><?xml version="1.0" encoding="utf-8"?>
 <p:properties xmlns:p="http://schemas.microsoft.com/office/2006/metadata/properties" xmlns:xsi="http://www.w3.org/2001/XMLSchema-instance" xmlns:pc="http://schemas.microsoft.com/office/infopath/2007/PartnerControls">
   <documentManagement>
@@ -24738,22 +25473,6 @@
 </file>
 
 <file path=customXml/itemProps1.xml><?xml version="1.0" encoding="utf-8"?>
-<ds:datastoreItem xmlns:ds="http://schemas.openxmlformats.org/officeDocument/2006/customXml" ds:itemID="{BB82CC63-55FC-4D22-9ED3-DB88AF6228E1}">
-  <ds:schemaRefs>
-    <ds:schemaRef ds:uri="http://schemas.microsoft.com/sharepoint/v3/contenttype/forms"/>
-  </ds:schemaRefs>
-</ds:datastoreItem>
-</file>
-
-<file path=customXml/itemProps2.xml><?xml version="1.0" encoding="utf-8"?>
-<ds:datastoreItem xmlns:ds="http://schemas.openxmlformats.org/officeDocument/2006/customXml" ds:itemID="{1B3F50AB-02FD-4C47-98D2-8857298FC473}">
-  <ds:schemaRefs>
-    <ds:schemaRef ds:uri="http://schemas.microsoft.com/sharepoint/events"/>
-  </ds:schemaRefs>
-</ds:datastoreItem>
-</file>
-
-<file path=customXml/itemProps3.xml><?xml version="1.0" encoding="utf-8"?>
 <ds:datastoreItem xmlns:ds="http://schemas.openxmlformats.org/officeDocument/2006/customXml" ds:itemID="{1F8D2ADD-9475-4053-913E-BB32E431EB0D}">
   <ds:schemaRefs>
     <ds:schemaRef ds:uri="http://schemas.microsoft.com/office/2006/metadata/contentType"/>
@@ -24768,6 +25487,22 @@
     <ds:schemaRef ds:uri="http://purl.org/dc/elements/1.1/"/>
     <ds:schemaRef ds:uri="http://purl.org/dc/terms/"/>
     <ds:schemaRef ds:uri="http://schemas.microsoft.com/internal/obd"/>
+  </ds:schemaRefs>
+</ds:datastoreItem>
+</file>
+
+<file path=customXml/itemProps2.xml><?xml version="1.0" encoding="utf-8"?>
+<ds:datastoreItem xmlns:ds="http://schemas.openxmlformats.org/officeDocument/2006/customXml" ds:itemID="{1B3F50AB-02FD-4C47-98D2-8857298FC473}">
+  <ds:schemaRefs>
+    <ds:schemaRef ds:uri="http://schemas.microsoft.com/sharepoint/events"/>
+  </ds:schemaRefs>
+</ds:datastoreItem>
+</file>
+
+<file path=customXml/itemProps3.xml><?xml version="1.0" encoding="utf-8"?>
+<ds:datastoreItem xmlns:ds="http://schemas.openxmlformats.org/officeDocument/2006/customXml" ds:itemID="{BB82CC63-55FC-4D22-9ED3-DB88AF6228E1}">
+  <ds:schemaRefs>
+    <ds:schemaRef ds:uri="http://schemas.microsoft.com/sharepoint/v3/contenttype/forms"/>
   </ds:schemaRefs>
 </ds:datastoreItem>
 </file>

</xml_diff>